<commit_message>
adding barbara's slides for orchids/mycorrhiza
</commit_message>
<xml_diff>
--- a/doc/slides/day1/session2/NGSdata.pptx
+++ b/doc/slides/day1/session2/NGSdata.pptx
@@ -193,7 +193,7 @@
             <a:fld id="{1CBEE33A-660E-C84A-B828-66CD4386E7A3}" type="datetimeFigureOut">
               <a:rPr lang="en-US" smtClean="0"/>
               <a:pPr/>
-              <a:t>8/29/12</a:t>
+              <a:t>9/1/12</a:t>
             </a:fld>
             <a:endParaRPr lang="en-US"/>
           </a:p>
@@ -511,11 +511,7 @@
             </a:r>
             <a:r>
               <a:rPr lang="en-US" baseline="0" dirty="0" smtClean="0"/>
-              <a:t> introduces a first look at data produced by various NGS platforms, file formats like FASTA, FASTQ, SFF, BAM/SAM, interval tables</a:t>
-            </a:r>
-            <a:r>
-              <a:rPr lang="en-US" baseline="0" dirty="0" smtClean="0"/>
-              <a:t>. Also introduces software tools to deal with NGS data, might mention visual tools such as CLC and </a:t>
+              <a:t> introduces a first look at data produced by various NGS platforms, file formats like FASTA, FASTQ, SFF, BAM/SAM, interval tables. Also introduces software tools to deal with NGS data, might mention visual tools such as CLC and </a:t>
             </a:r>
             <a:r>
               <a:rPr lang="en-US" baseline="0" dirty="0" err="1" smtClean="0"/>
@@ -523,11 +519,15 @@
             </a:r>
             <a:r>
               <a:rPr lang="en-US" baseline="0" dirty="0" smtClean="0"/>
-              <a:t> but show that command line tools have all functionality. Show periodic table of bioinformatics elements. Exercise: look at NGS data in a </a:t>
+              <a:t> but show that command line tools have all functionality. Show periodic table of bioinformatics elements. Exercise: look at NGS data in a text </a:t>
+            </a:r>
+            <a:r>
+              <a:rPr lang="en-US" baseline="0" dirty="0" smtClean="0"/>
+              <a:t>editor, determine what </a:t>
             </a:r>
             <a:r>
               <a:rPr lang="en-US" baseline="0" smtClean="0"/>
-              <a:t>text editor.</a:t>
+              <a:t>FASTQ dialect</a:t>
             </a:r>
             <a:endParaRPr lang="en-US" dirty="0"/>
           </a:p>
@@ -747,7 +747,7 @@
             <a:fld id="{4787E004-ACAC-BD41-B9FE-40E1A0F71FA8}" type="datetimeFigureOut">
               <a:rPr lang="en-US" smtClean="0"/>
               <a:pPr/>
-              <a:t>8/29/12</a:t>
+              <a:t>9/1/12</a:t>
             </a:fld>
             <a:endParaRPr lang="en-US"/>
           </a:p>
@@ -914,7 +914,7 @@
             <a:fld id="{4787E004-ACAC-BD41-B9FE-40E1A0F71FA8}" type="datetimeFigureOut">
               <a:rPr lang="en-US" smtClean="0"/>
               <a:pPr/>
-              <a:t>8/29/12</a:t>
+              <a:t>9/1/12</a:t>
             </a:fld>
             <a:endParaRPr lang="en-US"/>
           </a:p>
@@ -1091,7 +1091,7 @@
             <a:fld id="{4787E004-ACAC-BD41-B9FE-40E1A0F71FA8}" type="datetimeFigureOut">
               <a:rPr lang="en-US" smtClean="0"/>
               <a:pPr/>
-              <a:t>8/29/12</a:t>
+              <a:t>9/1/12</a:t>
             </a:fld>
             <a:endParaRPr lang="en-US"/>
           </a:p>
@@ -1258,7 +1258,7 @@
             <a:fld id="{4787E004-ACAC-BD41-B9FE-40E1A0F71FA8}" type="datetimeFigureOut">
               <a:rPr lang="en-US" smtClean="0"/>
               <a:pPr/>
-              <a:t>8/29/12</a:t>
+              <a:t>9/1/12</a:t>
             </a:fld>
             <a:endParaRPr lang="en-US"/>
           </a:p>
@@ -1501,7 +1501,7 @@
             <a:fld id="{4787E004-ACAC-BD41-B9FE-40E1A0F71FA8}" type="datetimeFigureOut">
               <a:rPr lang="en-US" smtClean="0"/>
               <a:pPr/>
-              <a:t>8/29/12</a:t>
+              <a:t>9/1/12</a:t>
             </a:fld>
             <a:endParaRPr lang="en-US"/>
           </a:p>
@@ -1786,7 +1786,7 @@
             <a:fld id="{4787E004-ACAC-BD41-B9FE-40E1A0F71FA8}" type="datetimeFigureOut">
               <a:rPr lang="en-US" smtClean="0"/>
               <a:pPr/>
-              <a:t>8/29/12</a:t>
+              <a:t>9/1/12</a:t>
             </a:fld>
             <a:endParaRPr lang="en-US"/>
           </a:p>
@@ -2205,7 +2205,7 @@
             <a:fld id="{4787E004-ACAC-BD41-B9FE-40E1A0F71FA8}" type="datetimeFigureOut">
               <a:rPr lang="en-US" smtClean="0"/>
               <a:pPr/>
-              <a:t>8/29/12</a:t>
+              <a:t>9/1/12</a:t>
             </a:fld>
             <a:endParaRPr lang="en-US"/>
           </a:p>
@@ -2320,7 +2320,7 @@
             <a:fld id="{4787E004-ACAC-BD41-B9FE-40E1A0F71FA8}" type="datetimeFigureOut">
               <a:rPr lang="en-US" smtClean="0"/>
               <a:pPr/>
-              <a:t>8/29/12</a:t>
+              <a:t>9/1/12</a:t>
             </a:fld>
             <a:endParaRPr lang="en-US"/>
           </a:p>
@@ -2412,7 +2412,7 @@
             <a:fld id="{4787E004-ACAC-BD41-B9FE-40E1A0F71FA8}" type="datetimeFigureOut">
               <a:rPr lang="en-US" smtClean="0"/>
               <a:pPr/>
-              <a:t>8/29/12</a:t>
+              <a:t>9/1/12</a:t>
             </a:fld>
             <a:endParaRPr lang="en-US"/>
           </a:p>
@@ -2686,7 +2686,7 @@
             <a:fld id="{4787E004-ACAC-BD41-B9FE-40E1A0F71FA8}" type="datetimeFigureOut">
               <a:rPr lang="en-US" smtClean="0"/>
               <a:pPr/>
-              <a:t>8/29/12</a:t>
+              <a:t>9/1/12</a:t>
             </a:fld>
             <a:endParaRPr lang="en-US"/>
           </a:p>
@@ -2936,7 +2936,7 @@
             <a:fld id="{4787E004-ACAC-BD41-B9FE-40E1A0F71FA8}" type="datetimeFigureOut">
               <a:rPr lang="en-US" smtClean="0"/>
               <a:pPr/>
-              <a:t>8/29/12</a:t>
+              <a:t>9/1/12</a:t>
             </a:fld>
             <a:endParaRPr lang="en-US"/>
           </a:p>
@@ -3146,7 +3146,7 @@
             <a:fld id="{4787E004-ACAC-BD41-B9FE-40E1A0F71FA8}" type="datetimeFigureOut">
               <a:rPr lang="en-US" smtClean="0"/>
               <a:pPr/>
-              <a:t>8/29/12</a:t>
+              <a:t>9/1/12</a:t>
             </a:fld>
             <a:endParaRPr lang="en-US"/>
           </a:p>

</xml_diff>

<commit_message>
starting to fill this in
</commit_message>
<xml_diff>
--- a/doc/slides/day1/session2/NGSdata.pptx
+++ b/doc/slides/day1/session2/NGSdata.pptx
@@ -5,20 +5,24 @@
     <p:sldMasterId id="2147483648" r:id="rId1"/>
   </p:sldMasterIdLst>
   <p:notesMasterIdLst>
-    <p:notesMasterId r:id="rId13"/>
+    <p:notesMasterId r:id="rId17"/>
   </p:notesMasterIdLst>
   <p:sldIdLst>
     <p:sldId id="256" r:id="rId2"/>
     <p:sldId id="257" r:id="rId3"/>
-    <p:sldId id="258" r:id="rId4"/>
-    <p:sldId id="259" r:id="rId5"/>
-    <p:sldId id="260" r:id="rId6"/>
-    <p:sldId id="261" r:id="rId7"/>
-    <p:sldId id="263" r:id="rId8"/>
-    <p:sldId id="264" r:id="rId9"/>
-    <p:sldId id="265" r:id="rId10"/>
-    <p:sldId id="262" r:id="rId11"/>
-    <p:sldId id="266" r:id="rId12"/>
+    <p:sldId id="267" r:id="rId4"/>
+    <p:sldId id="269" r:id="rId5"/>
+    <p:sldId id="268" r:id="rId6"/>
+    <p:sldId id="270" r:id="rId7"/>
+    <p:sldId id="258" r:id="rId8"/>
+    <p:sldId id="259" r:id="rId9"/>
+    <p:sldId id="260" r:id="rId10"/>
+    <p:sldId id="261" r:id="rId11"/>
+    <p:sldId id="263" r:id="rId12"/>
+    <p:sldId id="264" r:id="rId13"/>
+    <p:sldId id="265" r:id="rId14"/>
+    <p:sldId id="262" r:id="rId15"/>
+    <p:sldId id="266" r:id="rId16"/>
   </p:sldIdLst>
   <p:sldSz cx="9144000" cy="6858000" type="screen4x3"/>
   <p:notesSz cx="6858000" cy="9144000"/>
@@ -618,12 +622,52 @@
           <a:lstStyle/>
           <a:p>
             <a:r>
-              <a:rPr lang="en-US" dirty="0" smtClean="0"/>
-              <a:t>Distinguish</a:t>
-            </a:r>
-            <a:r>
-              <a:rPr lang="en-US" baseline="0" dirty="0" smtClean="0"/>
-              <a:t> between different manufacturers</a:t>
+              <a:rPr lang="en-US" dirty="0" err="1" smtClean="0"/>
+              <a:t>Phred's</a:t>
+            </a:r>
+            <a:r>
+              <a:rPr lang="en-US" dirty="0" smtClean="0"/>
+              <a:t> approach to base calling and calculating quality scores was outlined by Ewing et al.. To determine quality scores, </a:t>
+            </a:r>
+            <a:r>
+              <a:rPr lang="en-US" dirty="0" err="1" smtClean="0"/>
+              <a:t>Phred</a:t>
+            </a:r>
+            <a:r>
+              <a:rPr lang="en-US" dirty="0" smtClean="0"/>
+              <a:t> first calculates several parameters related to peak shape and peak resolution at each base. </a:t>
+            </a:r>
+            <a:r>
+              <a:rPr lang="en-US" dirty="0" err="1" smtClean="0"/>
+              <a:t>Phred</a:t>
+            </a:r>
+            <a:r>
+              <a:rPr lang="en-US" dirty="0" smtClean="0"/>
+              <a:t> then uses these parameters to look up a corresponding quality score in huge lookup tables. These lookup tables were generated from sequence traces where the correct sequence was known, and are hard coded in </a:t>
+            </a:r>
+            <a:r>
+              <a:rPr lang="en-US" dirty="0" err="1" smtClean="0"/>
+              <a:t>Phred</a:t>
+            </a:r>
+            <a:r>
+              <a:rPr lang="en-US" dirty="0" smtClean="0"/>
+              <a:t>; different lookup tables are used for different sequencing chemistries and machines. An evaluation of the accuracy of </a:t>
+            </a:r>
+            <a:r>
+              <a:rPr lang="en-US" dirty="0" err="1" smtClean="0"/>
+              <a:t>Phred</a:t>
+            </a:r>
+            <a:r>
+              <a:rPr lang="en-US" dirty="0" smtClean="0"/>
+              <a:t> quality scores for a number of variations in sequencing chemistry and instrumentation showed that </a:t>
+            </a:r>
+            <a:r>
+              <a:rPr lang="en-US" dirty="0" err="1" smtClean="0"/>
+              <a:t>Phred</a:t>
+            </a:r>
+            <a:r>
+              <a:rPr lang="en-US" dirty="0" smtClean="0"/>
+              <a:t> quality scores are highly accurate.[7]</a:t>
             </a:r>
             <a:endParaRPr lang="en-US" dirty="0"/>
           </a:p>
@@ -709,7 +753,11 @@
           <a:p>
             <a:r>
               <a:rPr lang="en-US" dirty="0" smtClean="0"/>
-              <a:t>Introduces the</a:t>
+              <a:t>Distinguish</a:t>
+            </a:r>
+            <a:r>
+              <a:rPr lang="en-US" baseline="0" dirty="0" smtClean="0"/>
+              <a:t> between different manufacturers</a:t>
             </a:r>
             <a:endParaRPr lang="en-US" dirty="0"/>
           </a:p>
@@ -733,7 +781,7 @@
             <a:fld id="{DC52FE66-5F38-224B-B84A-AC7B0050D720}" type="slidenum">
               <a:rPr lang="en-US" smtClean="0"/>
               <a:pPr/>
-              <a:t>10</a:t>
+              <a:t>7</a:t>
             </a:fld>
             <a:endParaRPr lang="en-US"/>
           </a:p>
@@ -795,15 +843,47 @@
           <a:p>
             <a:r>
               <a:rPr lang="en-US" dirty="0" smtClean="0"/>
-              <a:t>For this exercise</a:t>
-            </a:r>
-            <a:r>
-              <a:rPr lang="en-US" baseline="0" dirty="0" smtClean="0"/>
-              <a:t> we need FASTQ files in the different encountered formats under </a:t>
-            </a:r>
-            <a:r>
-              <a:rPr lang="en-US" baseline="0" smtClean="0"/>
-              <a:t>git</a:t>
+              <a:t>454 reads differ from standard sequencing reads in that the 454 data does not provide individual base measurements from which </a:t>
+            </a:r>
+            <a:r>
+              <a:rPr lang="en-US" dirty="0" err="1" smtClean="0"/>
+              <a:t>basecalls</a:t>
+            </a:r>
+            <a:r>
+              <a:rPr lang="en-US" dirty="0" smtClean="0"/>
+              <a:t> can be derived. Instead, it provides measurements that estimate the length of the next </a:t>
+            </a:r>
+            <a:r>
+              <a:rPr lang="en-US" dirty="0" err="1" smtClean="0"/>
+              <a:t>homopolymer</a:t>
+            </a:r>
+            <a:r>
+              <a:rPr lang="en-US" dirty="0" smtClean="0"/>
+              <a:t> stretch in the sequence (i.e., in "AAATGG", "AAA" is a 3-mer stretch of A's, "T" is a 1-mer stretch of T's and "GG" is a 2-mer stretch of G's). A </a:t>
+            </a:r>
+            <a:r>
+              <a:rPr lang="en-US" dirty="0" err="1" smtClean="0"/>
+              <a:t>basecalled</a:t>
+            </a:r>
+            <a:r>
+              <a:rPr lang="en-US" dirty="0" smtClean="0"/>
+              <a:t> sequence is then derived by converting each estimate into a </a:t>
+            </a:r>
+            <a:r>
+              <a:rPr lang="en-US" dirty="0" err="1" smtClean="0"/>
+              <a:t>homopolymer</a:t>
+            </a:r>
+            <a:r>
+              <a:rPr lang="en-US" dirty="0" smtClean="0"/>
+              <a:t> stretch of that length and concatenating the </a:t>
+            </a:r>
+            <a:r>
+              <a:rPr lang="en-US" dirty="0" err="1" smtClean="0"/>
+              <a:t>homopolymers</a:t>
+            </a:r>
+            <a:r>
+              <a:rPr lang="en-US" dirty="0" smtClean="0"/>
+              <a:t>.</a:t>
             </a:r>
             <a:endParaRPr lang="en-US" dirty="0"/>
           </a:p>
@@ -827,7 +907,187 @@
             <a:fld id="{DC52FE66-5F38-224B-B84A-AC7B0050D720}" type="slidenum">
               <a:rPr lang="en-US" smtClean="0"/>
               <a:pPr/>
-              <a:t>11</a:t>
+              <a:t>8</a:t>
+            </a:fld>
+            <a:endParaRPr lang="en-US"/>
+          </a:p>
+        </p:txBody>
+      </p:sp>
+    </p:spTree>
+  </p:cSld>
+  <p:clrMapOvr>
+    <a:masterClrMapping/>
+  </p:clrMapOvr>
+</p:notes>
+</file>
+
+<file path=ppt/notesSlides/notesSlide5.xml><?xml version="1.0" encoding="utf-8"?>
+<p:notes xmlns:a="http://schemas.openxmlformats.org/drawingml/2006/main" xmlns:r="http://schemas.openxmlformats.org/officeDocument/2006/relationships" xmlns:mc="http://schemas.openxmlformats.org/markup-compatibility/2006" xmlns:mv="urn:schemas-microsoft-com:mac:vml" xmlns:p="http://schemas.openxmlformats.org/presentationml/2006/main" mc:Ignorable="mv" mc:PreserveAttributes="mv:*">
+  <p:cSld>
+    <p:spTree>
+      <p:nvGrpSpPr>
+        <p:cNvPr id="1" name=""/>
+        <p:cNvGrpSpPr/>
+        <p:nvPr/>
+      </p:nvGrpSpPr>
+      <p:grpSpPr>
+        <a:xfrm>
+          <a:off x="0" y="0"/>
+          <a:ext cx="0" cy="0"/>
+          <a:chOff x="0" y="0"/>
+          <a:chExt cx="0" cy="0"/>
+        </a:xfrm>
+      </p:grpSpPr>
+      <p:sp>
+        <p:nvSpPr>
+          <p:cNvPr id="2" name="Slide Image Placeholder 1"/>
+          <p:cNvSpPr>
+            <a:spLocks noGrp="1" noRot="1" noChangeAspect="1"/>
+          </p:cNvSpPr>
+          <p:nvPr>
+            <p:ph type="sldImg"/>
+          </p:nvPr>
+        </p:nvSpPr>
+        <p:spPr/>
+      </p:sp>
+      <p:sp>
+        <p:nvSpPr>
+          <p:cNvPr id="3" name="Notes Placeholder 2"/>
+          <p:cNvSpPr>
+            <a:spLocks noGrp="1"/>
+          </p:cNvSpPr>
+          <p:nvPr>
+            <p:ph type="body" idx="1"/>
+          </p:nvPr>
+        </p:nvSpPr>
+        <p:spPr/>
+        <p:txBody>
+          <a:bodyPr>
+            <a:normAutofit/>
+          </a:bodyPr>
+          <a:lstStyle/>
+          <a:p>
+            <a:r>
+              <a:rPr lang="en-US" dirty="0" smtClean="0"/>
+              <a:t>Introduces the</a:t>
+            </a:r>
+            <a:endParaRPr lang="en-US" dirty="0"/>
+          </a:p>
+        </p:txBody>
+      </p:sp>
+      <p:sp>
+        <p:nvSpPr>
+          <p:cNvPr id="4" name="Slide Number Placeholder 3"/>
+          <p:cNvSpPr>
+            <a:spLocks noGrp="1"/>
+          </p:cNvSpPr>
+          <p:nvPr>
+            <p:ph type="sldNum" sz="quarter" idx="10"/>
+          </p:nvPr>
+        </p:nvSpPr>
+        <p:spPr/>
+        <p:txBody>
+          <a:bodyPr/>
+          <a:lstStyle/>
+          <a:p>
+            <a:fld id="{DC52FE66-5F38-224B-B84A-AC7B0050D720}" type="slidenum">
+              <a:rPr lang="en-US" smtClean="0"/>
+              <a:pPr/>
+              <a:t>14</a:t>
+            </a:fld>
+            <a:endParaRPr lang="en-US"/>
+          </a:p>
+        </p:txBody>
+      </p:sp>
+    </p:spTree>
+  </p:cSld>
+  <p:clrMapOvr>
+    <a:masterClrMapping/>
+  </p:clrMapOvr>
+</p:notes>
+</file>
+
+<file path=ppt/notesSlides/notesSlide6.xml><?xml version="1.0" encoding="utf-8"?>
+<p:notes xmlns:a="http://schemas.openxmlformats.org/drawingml/2006/main" xmlns:r="http://schemas.openxmlformats.org/officeDocument/2006/relationships" xmlns:mc="http://schemas.openxmlformats.org/markup-compatibility/2006" xmlns:mv="urn:schemas-microsoft-com:mac:vml" xmlns:p="http://schemas.openxmlformats.org/presentationml/2006/main" mc:Ignorable="mv" mc:PreserveAttributes="mv:*">
+  <p:cSld>
+    <p:spTree>
+      <p:nvGrpSpPr>
+        <p:cNvPr id="1" name=""/>
+        <p:cNvGrpSpPr/>
+        <p:nvPr/>
+      </p:nvGrpSpPr>
+      <p:grpSpPr>
+        <a:xfrm>
+          <a:off x="0" y="0"/>
+          <a:ext cx="0" cy="0"/>
+          <a:chOff x="0" y="0"/>
+          <a:chExt cx="0" cy="0"/>
+        </a:xfrm>
+      </p:grpSpPr>
+      <p:sp>
+        <p:nvSpPr>
+          <p:cNvPr id="2" name="Slide Image Placeholder 1"/>
+          <p:cNvSpPr>
+            <a:spLocks noGrp="1" noRot="1" noChangeAspect="1"/>
+          </p:cNvSpPr>
+          <p:nvPr>
+            <p:ph type="sldImg"/>
+          </p:nvPr>
+        </p:nvSpPr>
+        <p:spPr/>
+      </p:sp>
+      <p:sp>
+        <p:nvSpPr>
+          <p:cNvPr id="3" name="Notes Placeholder 2"/>
+          <p:cNvSpPr>
+            <a:spLocks noGrp="1"/>
+          </p:cNvSpPr>
+          <p:nvPr>
+            <p:ph type="body" idx="1"/>
+          </p:nvPr>
+        </p:nvSpPr>
+        <p:spPr/>
+        <p:txBody>
+          <a:bodyPr>
+            <a:normAutofit/>
+          </a:bodyPr>
+          <a:lstStyle/>
+          <a:p>
+            <a:r>
+              <a:rPr lang="en-US" dirty="0" smtClean="0"/>
+              <a:t>For this exercise</a:t>
+            </a:r>
+            <a:r>
+              <a:rPr lang="en-US" baseline="0" dirty="0" smtClean="0"/>
+              <a:t> we need FASTQ files in the different encountered formats under </a:t>
+            </a:r>
+            <a:r>
+              <a:rPr lang="en-US" baseline="0" smtClean="0"/>
+              <a:t>git</a:t>
+            </a:r>
+            <a:endParaRPr lang="en-US" dirty="0"/>
+          </a:p>
+        </p:txBody>
+      </p:sp>
+      <p:sp>
+        <p:nvSpPr>
+          <p:cNvPr id="4" name="Slide Number Placeholder 3"/>
+          <p:cNvSpPr>
+            <a:spLocks noGrp="1"/>
+          </p:cNvSpPr>
+          <p:nvPr>
+            <p:ph type="sldNum" sz="quarter" idx="10"/>
+          </p:nvPr>
+        </p:nvSpPr>
+        <p:spPr/>
+        <p:txBody>
+          <a:bodyPr/>
+          <a:lstStyle/>
+          <a:p>
+            <a:fld id="{DC52FE66-5F38-224B-B84A-AC7B0050D720}" type="slidenum">
+              <a:rPr lang="en-US" smtClean="0"/>
+              <a:pPr/>
+              <a:t>15</a:t>
             </a:fld>
             <a:endParaRPr lang="en-US"/>
           </a:p>
@@ -3844,6 +4104,13 @@
   <p:clrMapOvr>
     <a:masterClrMapping/>
   </p:clrMapOvr>
+  <p:timing>
+    <p:tnLst>
+      <p:par>
+        <p:cTn id="1" dur="indefinite" restart="never" nodeType="tmRoot"/>
+      </p:par>
+    </p:tnLst>
+  </p:timing>
 </p:sld>
 </file>
 
@@ -3881,7 +4148,7 @@
           <a:p>
             <a:r>
               <a:rPr lang="en-US" dirty="0" smtClean="0"/>
-              <a:t>Periodic table of bioinformatics</a:t>
+              <a:t>Commonly-used tools</a:t>
             </a:r>
             <a:endParaRPr lang="en-US" dirty="0"/>
           </a:p>
@@ -3902,7 +4169,56 @@
           <a:bodyPr/>
           <a:lstStyle/>
           <a:p>
-            <a:endParaRPr lang="en-US"/>
+            <a:r>
+              <a:rPr lang="en-US" dirty="0" err="1" smtClean="0"/>
+              <a:t>samtools</a:t>
+            </a:r>
+            <a:endParaRPr lang="en-US" dirty="0" smtClean="0"/>
+          </a:p>
+          <a:p>
+            <a:r>
+              <a:rPr lang="en-US" dirty="0" err="1" smtClean="0"/>
+              <a:t>bwa</a:t>
+            </a:r>
+            <a:endParaRPr lang="en-US" dirty="0" smtClean="0"/>
+          </a:p>
+          <a:p>
+            <a:r>
+              <a:rPr lang="en-US" dirty="0" smtClean="0"/>
+              <a:t>GATK</a:t>
+            </a:r>
+          </a:p>
+          <a:p>
+            <a:r>
+              <a:rPr lang="en-US" dirty="0" err="1" smtClean="0"/>
+              <a:t>picard</a:t>
+            </a:r>
+            <a:endParaRPr lang="en-US" dirty="0" smtClean="0"/>
+          </a:p>
+          <a:p>
+            <a:r>
+              <a:rPr lang="en-US" dirty="0" smtClean="0"/>
+              <a:t>bowtie/</a:t>
+            </a:r>
+            <a:r>
+              <a:rPr lang="en-US" dirty="0" err="1" smtClean="0"/>
+              <a:t>tophat</a:t>
+            </a:r>
+            <a:r>
+              <a:rPr lang="en-US" dirty="0" smtClean="0"/>
+              <a:t>/</a:t>
+            </a:r>
+            <a:r>
+              <a:rPr lang="en-US" dirty="0" smtClean="0"/>
+              <a:t>cufflinks</a:t>
+            </a:r>
+          </a:p>
+          <a:p>
+            <a:r>
+              <a:rPr lang="en-US" dirty="0" err="1" smtClean="0"/>
+              <a:t>fastqc</a:t>
+            </a:r>
+            <a:endParaRPr lang="en-US" dirty="0"/>
           </a:p>
         </p:txBody>
       </p:sp>
@@ -3911,6 +4227,13 @@
   <p:clrMapOvr>
     <a:masterClrMapping/>
   </p:clrMapOvr>
+  <p:timing>
+    <p:tnLst>
+      <p:par>
+        <p:cTn id="1" dur="indefinite" restart="never" nodeType="tmRoot"/>
+      </p:par>
+    </p:tnLst>
+  </p:timing>
 </p:sld>
 </file>
 
@@ -3948,7 +4271,7 @@
           <a:p>
             <a:r>
               <a:rPr lang="en-US" dirty="0" smtClean="0"/>
-              <a:t>Exercise: FASTQ dialects</a:t>
+              <a:t>Integrated suites</a:t>
             </a:r>
             <a:endParaRPr lang="en-US" dirty="0"/>
           </a:p>
@@ -3969,7 +4292,17 @@
           <a:bodyPr/>
           <a:lstStyle/>
           <a:p>
-            <a:endParaRPr lang="en-US"/>
+            <a:r>
+              <a:rPr lang="en-US" dirty="0" smtClean="0"/>
+              <a:t>CLC</a:t>
+            </a:r>
+          </a:p>
+          <a:p>
+            <a:r>
+              <a:rPr lang="en-US" dirty="0" err="1" smtClean="0"/>
+              <a:t>Geneious</a:t>
+            </a:r>
+            <a:endParaRPr lang="en-US" dirty="0"/>
           </a:p>
         </p:txBody>
       </p:sp>
@@ -3978,6 +4311,327 @@
   <p:clrMapOvr>
     <a:masterClrMapping/>
   </p:clrMapOvr>
+  <p:timing>
+    <p:tnLst>
+      <p:par>
+        <p:cTn id="1" dur="indefinite" restart="never" nodeType="tmRoot"/>
+      </p:par>
+    </p:tnLst>
+  </p:timing>
+</p:sld>
+</file>
+
+<file path=ppt/slides/slide12.xml><?xml version="1.0" encoding="utf-8"?>
+<p:sld xmlns:a="http://schemas.openxmlformats.org/drawingml/2006/main" xmlns:r="http://schemas.openxmlformats.org/officeDocument/2006/relationships" xmlns:mc="http://schemas.openxmlformats.org/markup-compatibility/2006" xmlns:mv="urn:schemas-microsoft-com:mac:vml" xmlns:p="http://schemas.openxmlformats.org/presentationml/2006/main" mc:Ignorable="mv" mc:PreserveAttributes="mv:*">
+  <p:cSld>
+    <p:spTree>
+      <p:nvGrpSpPr>
+        <p:cNvPr id="1" name=""/>
+        <p:cNvGrpSpPr/>
+        <p:nvPr/>
+      </p:nvGrpSpPr>
+      <p:grpSpPr>
+        <a:xfrm>
+          <a:off x="0" y="0"/>
+          <a:ext cx="0" cy="0"/>
+          <a:chOff x="0" y="0"/>
+          <a:chExt cx="0" cy="0"/>
+        </a:xfrm>
+      </p:grpSpPr>
+      <p:sp>
+        <p:nvSpPr>
+          <p:cNvPr id="2" name="Title 1"/>
+          <p:cNvSpPr>
+            <a:spLocks noGrp="1"/>
+          </p:cNvSpPr>
+          <p:nvPr>
+            <p:ph type="title"/>
+          </p:nvPr>
+        </p:nvSpPr>
+        <p:spPr/>
+        <p:txBody>
+          <a:bodyPr/>
+          <a:lstStyle/>
+          <a:p>
+            <a:r>
+              <a:rPr lang="en-US" dirty="0" smtClean="0"/>
+              <a:t>Open source and commercial</a:t>
+            </a:r>
+            <a:endParaRPr lang="en-US" dirty="0"/>
+          </a:p>
+        </p:txBody>
+      </p:sp>
+      <p:sp>
+        <p:nvSpPr>
+          <p:cNvPr id="3" name="Content Placeholder 2"/>
+          <p:cNvSpPr>
+            <a:spLocks noGrp="1"/>
+          </p:cNvSpPr>
+          <p:nvPr>
+            <p:ph idx="1"/>
+          </p:nvPr>
+        </p:nvSpPr>
+        <p:spPr/>
+        <p:txBody>
+          <a:bodyPr/>
+          <a:lstStyle/>
+          <a:p>
+            <a:endParaRPr lang="en-US"/>
+          </a:p>
+        </p:txBody>
+      </p:sp>
+    </p:spTree>
+  </p:cSld>
+  <p:clrMapOvr>
+    <a:masterClrMapping/>
+  </p:clrMapOvr>
+  <p:timing>
+    <p:tnLst>
+      <p:par>
+        <p:cTn id="1" dur="indefinite" restart="never" nodeType="tmRoot"/>
+      </p:par>
+    </p:tnLst>
+  </p:timing>
+</p:sld>
+</file>
+
+<file path=ppt/slides/slide13.xml><?xml version="1.0" encoding="utf-8"?>
+<p:sld xmlns:a="http://schemas.openxmlformats.org/drawingml/2006/main" xmlns:r="http://schemas.openxmlformats.org/officeDocument/2006/relationships" xmlns:mc="http://schemas.openxmlformats.org/markup-compatibility/2006" xmlns:mv="urn:schemas-microsoft-com:mac:vml" xmlns:p="http://schemas.openxmlformats.org/presentationml/2006/main" mc:Ignorable="mv" mc:PreserveAttributes="mv:*">
+  <p:cSld>
+    <p:spTree>
+      <p:nvGrpSpPr>
+        <p:cNvPr id="1" name=""/>
+        <p:cNvGrpSpPr/>
+        <p:nvPr/>
+      </p:nvGrpSpPr>
+      <p:grpSpPr>
+        <a:xfrm>
+          <a:off x="0" y="0"/>
+          <a:ext cx="0" cy="0"/>
+          <a:chOff x="0" y="0"/>
+          <a:chExt cx="0" cy="0"/>
+        </a:xfrm>
+      </p:grpSpPr>
+      <p:sp>
+        <p:nvSpPr>
+          <p:cNvPr id="2" name="Title 1"/>
+          <p:cNvSpPr>
+            <a:spLocks noGrp="1"/>
+          </p:cNvSpPr>
+          <p:nvPr>
+            <p:ph type="title"/>
+          </p:nvPr>
+        </p:nvSpPr>
+        <p:spPr/>
+        <p:txBody>
+          <a:bodyPr/>
+          <a:lstStyle/>
+          <a:p>
+            <a:r>
+              <a:rPr lang="en-US" dirty="0" smtClean="0"/>
+              <a:t>Visual and command-line</a:t>
+            </a:r>
+            <a:endParaRPr lang="en-US" dirty="0"/>
+          </a:p>
+        </p:txBody>
+      </p:sp>
+      <p:sp>
+        <p:nvSpPr>
+          <p:cNvPr id="3" name="Content Placeholder 2"/>
+          <p:cNvSpPr>
+            <a:spLocks noGrp="1"/>
+          </p:cNvSpPr>
+          <p:nvPr>
+            <p:ph idx="1"/>
+          </p:nvPr>
+        </p:nvSpPr>
+        <p:spPr/>
+        <p:txBody>
+          <a:bodyPr/>
+          <a:lstStyle/>
+          <a:p>
+            <a:endParaRPr lang="en-US"/>
+          </a:p>
+        </p:txBody>
+      </p:sp>
+    </p:spTree>
+  </p:cSld>
+  <p:clrMapOvr>
+    <a:masterClrMapping/>
+  </p:clrMapOvr>
+  <p:timing>
+    <p:tnLst>
+      <p:par>
+        <p:cTn id="1" dur="indefinite" restart="never" nodeType="tmRoot"/>
+      </p:par>
+    </p:tnLst>
+  </p:timing>
+</p:sld>
+</file>
+
+<file path=ppt/slides/slide14.xml><?xml version="1.0" encoding="utf-8"?>
+<p:sld xmlns:a="http://schemas.openxmlformats.org/drawingml/2006/main" xmlns:r="http://schemas.openxmlformats.org/officeDocument/2006/relationships" xmlns:mc="http://schemas.openxmlformats.org/markup-compatibility/2006" xmlns:mv="urn:schemas-microsoft-com:mac:vml" xmlns:p="http://schemas.openxmlformats.org/presentationml/2006/main" mc:Ignorable="mv" mc:PreserveAttributes="mv:*">
+  <p:cSld>
+    <p:spTree>
+      <p:nvGrpSpPr>
+        <p:cNvPr id="1" name=""/>
+        <p:cNvGrpSpPr/>
+        <p:nvPr/>
+      </p:nvGrpSpPr>
+      <p:grpSpPr>
+        <a:xfrm>
+          <a:off x="0" y="0"/>
+          <a:ext cx="0" cy="0"/>
+          <a:chOff x="0" y="0"/>
+          <a:chExt cx="0" cy="0"/>
+        </a:xfrm>
+      </p:grpSpPr>
+      <p:sp>
+        <p:nvSpPr>
+          <p:cNvPr id="2" name="Title 1"/>
+          <p:cNvSpPr>
+            <a:spLocks noGrp="1"/>
+          </p:cNvSpPr>
+          <p:nvPr>
+            <p:ph type="title"/>
+          </p:nvPr>
+        </p:nvSpPr>
+        <p:spPr/>
+        <p:txBody>
+          <a:bodyPr/>
+          <a:lstStyle/>
+          <a:p>
+            <a:r>
+              <a:rPr lang="en-US" dirty="0" smtClean="0"/>
+              <a:t>Periodic table of bioinformatics</a:t>
+            </a:r>
+            <a:endParaRPr lang="en-US" dirty="0"/>
+          </a:p>
+        </p:txBody>
+      </p:sp>
+      <p:pic>
+        <p:nvPicPr>
+          <p:cNvPr id="4" name="Content Placeholder 3" descr="elements-72dpi.pdf"/>
+          <p:cNvPicPr>
+            <a:picLocks noGrp="1" noChangeAspect="1"/>
+          </p:cNvPicPr>
+          <p:nvPr>
+            <p:ph idx="1"/>
+          </p:nvPr>
+        </p:nvPicPr>
+        <mc:AlternateContent>
+          <mc:Choice xmlns:ma="http://schemas.microsoft.com/office/mac/drawingml/2008/main" Requires="ma">
+            <p:blipFill>
+              <a:blip r:embed="rId3"/>
+              <a:srcRect l="2525" t="23206"/>
+              <a:stretch>
+                <a:fillRect/>
+              </a:stretch>
+            </p:blipFill>
+          </mc:Choice>
+          <mc:Fallback>
+            <p:blipFill>
+              <a:blip r:embed="rId4"/>
+              <a:srcRect l="2525" t="23206"/>
+              <a:stretch>
+                <a:fillRect/>
+              </a:stretch>
+            </p:blipFill>
+          </mc:Fallback>
+        </mc:AlternateContent>
+        <p:spPr>
+          <a:xfrm>
+            <a:off x="76200" y="1371600"/>
+            <a:ext cx="8944174" cy="4983162"/>
+          </a:xfrm>
+        </p:spPr>
+      </p:pic>
+    </p:spTree>
+  </p:cSld>
+  <p:clrMapOvr>
+    <a:masterClrMapping/>
+  </p:clrMapOvr>
+  <p:timing>
+    <p:tnLst>
+      <p:par>
+        <p:cTn id="1" dur="indefinite" restart="never" nodeType="tmRoot"/>
+      </p:par>
+    </p:tnLst>
+  </p:timing>
+</p:sld>
+</file>
+
+<file path=ppt/slides/slide15.xml><?xml version="1.0" encoding="utf-8"?>
+<p:sld xmlns:a="http://schemas.openxmlformats.org/drawingml/2006/main" xmlns:r="http://schemas.openxmlformats.org/officeDocument/2006/relationships" xmlns:mc="http://schemas.openxmlformats.org/markup-compatibility/2006" xmlns:mv="urn:schemas-microsoft-com:mac:vml" xmlns:p="http://schemas.openxmlformats.org/presentationml/2006/main" mc:Ignorable="mv" mc:PreserveAttributes="mv:*">
+  <p:cSld>
+    <p:spTree>
+      <p:nvGrpSpPr>
+        <p:cNvPr id="1" name=""/>
+        <p:cNvGrpSpPr/>
+        <p:nvPr/>
+      </p:nvGrpSpPr>
+      <p:grpSpPr>
+        <a:xfrm>
+          <a:off x="0" y="0"/>
+          <a:ext cx="0" cy="0"/>
+          <a:chOff x="0" y="0"/>
+          <a:chExt cx="0" cy="0"/>
+        </a:xfrm>
+      </p:grpSpPr>
+      <p:sp>
+        <p:nvSpPr>
+          <p:cNvPr id="2" name="Title 1"/>
+          <p:cNvSpPr>
+            <a:spLocks noGrp="1"/>
+          </p:cNvSpPr>
+          <p:nvPr>
+            <p:ph type="title"/>
+          </p:nvPr>
+        </p:nvSpPr>
+        <p:spPr/>
+        <p:txBody>
+          <a:bodyPr/>
+          <a:lstStyle/>
+          <a:p>
+            <a:r>
+              <a:rPr lang="en-US" dirty="0" smtClean="0"/>
+              <a:t>Exercise: FASTQ dialects</a:t>
+            </a:r>
+            <a:endParaRPr lang="en-US" dirty="0"/>
+          </a:p>
+        </p:txBody>
+      </p:sp>
+      <p:sp>
+        <p:nvSpPr>
+          <p:cNvPr id="3" name="Content Placeholder 2"/>
+          <p:cNvSpPr>
+            <a:spLocks noGrp="1"/>
+          </p:cNvSpPr>
+          <p:nvPr>
+            <p:ph idx="1"/>
+          </p:nvPr>
+        </p:nvSpPr>
+        <p:spPr/>
+        <p:txBody>
+          <a:bodyPr/>
+          <a:lstStyle/>
+          <a:p>
+            <a:endParaRPr lang="en-US"/>
+          </a:p>
+        </p:txBody>
+      </p:sp>
+    </p:spTree>
+  </p:cSld>
+  <p:clrMapOvr>
+    <a:masterClrMapping/>
+  </p:clrMapOvr>
+  <p:timing>
+    <p:tnLst>
+      <p:par>
+        <p:cTn id="1" dur="indefinite" restart="never" nodeType="tmRoot"/>
+      </p:par>
+    </p:tnLst>
+  </p:timing>
 </p:sld>
 </file>
 
@@ -4038,13 +4692,11 @@
           <a:p>
             <a:r>
               <a:rPr lang="en-US" dirty="0" smtClean="0"/>
-              <a:t>Binary</a:t>
-            </a:r>
-          </a:p>
-          <a:p>
-            <a:r>
-              <a:rPr lang="en-US" dirty="0" smtClean="0"/>
-              <a:t>Text-based</a:t>
+              <a:t>Binary or text</a:t>
+            </a:r>
+            <a:r>
+              <a:rPr lang="en-US" dirty="0" smtClean="0"/>
+              <a:t>-based</a:t>
             </a:r>
           </a:p>
           <a:p>
@@ -4052,11 +4704,16 @@
               <a:rPr lang="en-US" dirty="0" smtClean="0"/>
               <a:t>High-volume, simple</a:t>
             </a:r>
-          </a:p>
-          <a:p>
-            <a:r>
-              <a:rPr lang="en-US" dirty="0" smtClean="0"/>
-              <a:t>Either sequence or </a:t>
+            <a:endParaRPr lang="en-US" dirty="0" smtClean="0"/>
+          </a:p>
+          <a:p>
+            <a:r>
+              <a:rPr lang="en-US" dirty="0" smtClean="0"/>
+              <a:t>Single sequence </a:t>
+            </a:r>
+            <a:r>
+              <a:rPr lang="en-US" dirty="0" smtClean="0"/>
+              <a:t>or </a:t>
             </a:r>
             <a:r>
               <a:rPr lang="en-US" dirty="0" err="1" smtClean="0"/>
@@ -4064,7 +4721,17 @@
             </a:r>
             <a:r>
               <a:rPr lang="en-US" dirty="0" smtClean="0"/>
-              <a:t> aligned</a:t>
+              <a:t> </a:t>
+            </a:r>
+            <a:r>
+              <a:rPr lang="en-US" dirty="0" smtClean="0"/>
+              <a:t>aligned</a:t>
+            </a:r>
+          </a:p>
+          <a:p>
+            <a:r>
+              <a:rPr lang="en-US" dirty="0" smtClean="0"/>
+              <a:t>With quality scores</a:t>
             </a:r>
             <a:endParaRPr lang="en-US" dirty="0"/>
           </a:p>
@@ -4075,6 +4742,13 @@
   <p:clrMapOvr>
     <a:masterClrMapping/>
   </p:clrMapOvr>
+  <p:timing>
+    <p:tnLst>
+      <p:par>
+        <p:cTn id="1" dur="indefinite" restart="never" nodeType="tmRoot"/>
+      </p:par>
+    </p:tnLst>
+  </p:timing>
 </p:sld>
 </file>
 
@@ -4111,8 +4785,12 @@
           <a:lstStyle/>
           <a:p>
             <a:r>
-              <a:rPr lang="en-US" dirty="0" smtClean="0"/>
-              <a:t>FASTQ</a:t>
+              <a:rPr lang="en-US" dirty="0" err="1" smtClean="0"/>
+              <a:t>Phred</a:t>
+            </a:r>
+            <a:r>
+              <a:rPr lang="en-US" dirty="0" smtClean="0"/>
+              <a:t> scores</a:t>
             </a:r>
             <a:endParaRPr lang="en-US" dirty="0"/>
           </a:p>
@@ -4120,31 +4798,91 @@
       </p:sp>
       <p:sp>
         <p:nvSpPr>
-          <p:cNvPr id="3" name="Content Placeholder 2"/>
-          <p:cNvSpPr>
-            <a:spLocks noGrp="1"/>
-          </p:cNvSpPr>
-          <p:nvPr>
-            <p:ph idx="1"/>
-          </p:nvPr>
-        </p:nvSpPr>
-        <p:spPr/>
-        <p:txBody>
-          <a:bodyPr/>
-          <a:lstStyle/>
-          <a:p>
-            <a:pPr>
+          <p:cNvPr id="4" name="Content Placeholder 3"/>
+          <p:cNvSpPr>
+            <a:spLocks noGrp="1"/>
+          </p:cNvSpPr>
+          <p:nvPr>
+            <p:ph sz="half" idx="1"/>
+          </p:nvPr>
+        </p:nvSpPr>
+        <p:spPr/>
+        <p:txBody>
+          <a:bodyPr>
+            <a:normAutofit lnSpcReduction="10000"/>
+          </a:bodyPr>
+          <a:lstStyle/>
+          <a:p>
+            <a:pPr marL="0" indent="0">
               <a:buNone/>
             </a:pPr>
+            <a:r>
+              <a:rPr lang="en-US" dirty="0" err="1" smtClean="0"/>
+              <a:t>Phred</a:t>
+            </a:r>
+            <a:r>
+              <a:rPr lang="en-US" dirty="0" smtClean="0"/>
+              <a:t> quality scores are used for</a:t>
+            </a:r>
+            <a:r>
+              <a:rPr lang="en-US" dirty="0" smtClean="0"/>
+              <a:t>:</a:t>
+            </a:r>
+          </a:p>
+          <a:p>
+            <a:r>
+              <a:rPr lang="en-US" dirty="0" smtClean="0"/>
+              <a:t>Assessment of sequence quality</a:t>
+            </a:r>
+          </a:p>
+          <a:p>
+            <a:r>
+              <a:rPr lang="en-US" dirty="0" smtClean="0"/>
+              <a:t>Recognition and removal of low-quality sequence (end clipping)</a:t>
+            </a:r>
+          </a:p>
+          <a:p>
+            <a:r>
+              <a:rPr lang="en-US" dirty="0" smtClean="0"/>
+              <a:t>Determination of accurate consensus sequences</a:t>
+            </a:r>
+          </a:p>
+          <a:p>
             <a:endParaRPr lang="en-US" dirty="0"/>
           </a:p>
         </p:txBody>
       </p:sp>
+      <p:pic>
+        <p:nvPicPr>
+          <p:cNvPr id="6" name="Content Placeholder 5" descr="sequence_trace_MED.jpeg"/>
+          <p:cNvPicPr>
+            <a:picLocks noGrp="1" noChangeAspect="1"/>
+          </p:cNvPicPr>
+          <p:nvPr>
+            <p:ph sz="half" idx="2"/>
+          </p:nvPr>
+        </p:nvPicPr>
+        <p:blipFill>
+          <a:blip r:embed="rId3"/>
+          <a:srcRect l="-76" r="-76"/>
+          <a:stretch>
+            <a:fillRect/>
+          </a:stretch>
+        </p:blipFill>
+        <p:spPr/>
+      </p:pic>
     </p:spTree>
   </p:cSld>
   <p:clrMapOvr>
     <a:masterClrMapping/>
   </p:clrMapOvr>
+  <p:timing>
+    <p:tnLst>
+      <p:par>
+        <p:cTn id="1" dur="indefinite" restart="never" nodeType="tmRoot"/>
+      </p:par>
+    </p:tnLst>
+  </p:timing>
 </p:sld>
 </file>
 
@@ -4181,8 +4919,12 @@
           <a:lstStyle/>
           <a:p>
             <a:r>
-              <a:rPr lang="en-US" dirty="0" smtClean="0"/>
-              <a:t>SFF</a:t>
+              <a:rPr lang="en-US" dirty="0" err="1" smtClean="0"/>
+              <a:t>Phred</a:t>
+            </a:r>
+            <a:r>
+              <a:rPr lang="en-US" dirty="0" smtClean="0"/>
+              <a:t> scores</a:t>
             </a:r>
             <a:endParaRPr lang="en-US" dirty="0"/>
           </a:p>
@@ -4203,15 +4945,357 @@
           <a:bodyPr/>
           <a:lstStyle/>
           <a:p>
-            <a:endParaRPr lang="en-US"/>
-          </a:p>
-        </p:txBody>
-      </p:sp>
+            <a:r>
+              <a:rPr lang="en-US" dirty="0" err="1" smtClean="0"/>
+              <a:t>Phred</a:t>
+            </a:r>
+            <a:r>
+              <a:rPr lang="en-US" dirty="0" smtClean="0"/>
+              <a:t> quality scores  are defined as a property which is logarithmically related to the base-calling error </a:t>
+            </a:r>
+            <a:r>
+              <a:rPr lang="en-US" dirty="0" smtClean="0"/>
+              <a:t>probabilities.</a:t>
+            </a:r>
+            <a:endParaRPr lang="en-US" dirty="0" smtClean="0"/>
+          </a:p>
+          <a:p>
+            <a:r>
+              <a:rPr lang="en-US" i="1" dirty="0" smtClean="0"/>
+              <a:t>Q</a:t>
+            </a:r>
+            <a:r>
+              <a:rPr lang="en-US" dirty="0" smtClean="0"/>
+              <a:t> = -10 log</a:t>
+            </a:r>
+            <a:r>
+              <a:rPr lang="en-US" baseline="-25000" dirty="0" smtClean="0"/>
+              <a:t>10</a:t>
+            </a:r>
+            <a:r>
+              <a:rPr lang="en-US" dirty="0" smtClean="0"/>
+              <a:t> </a:t>
+            </a:r>
+            <a:r>
+              <a:rPr lang="en-US" i="1" dirty="0" smtClean="0"/>
+              <a:t>P</a:t>
+            </a:r>
+            <a:endParaRPr lang="en-US" i="1" dirty="0"/>
+          </a:p>
+        </p:txBody>
+      </p:sp>
+      <p:graphicFrame>
+        <p:nvGraphicFramePr>
+          <p:cNvPr id="5" name="Content Placeholder 4"/>
+          <p:cNvGraphicFramePr>
+            <a:graphicFrameLocks noGrp="1"/>
+          </p:cNvGraphicFramePr>
+          <p:nvPr>
+            <p:ph sz="half" idx="4294967295"/>
+          </p:nvPr>
+        </p:nvGraphicFramePr>
+        <p:xfrm>
+          <a:off x="533400" y="4023360"/>
+          <a:ext cx="8001000" cy="2225040"/>
+        </p:xfrm>
+        <a:graphic>
+          <a:graphicData uri="http://schemas.openxmlformats.org/drawingml/2006/table">
+            <a:tbl>
+              <a:tblPr firstRow="1" bandRow="1">
+                <a:tableStyleId>{5C22544A-7EE6-4342-B048-85BDC9FD1C3A}</a:tableStyleId>
+              </a:tblPr>
+              <a:tblGrid>
+                <a:gridCol w="2667000"/>
+                <a:gridCol w="2667000"/>
+                <a:gridCol w="2667000"/>
+              </a:tblGrid>
+              <a:tr h="370840">
+                <a:tc>
+                  <a:txBody>
+                    <a:bodyPr/>
+                    <a:lstStyle/>
+                    <a:p>
+                      <a:r>
+                        <a:rPr lang="en-US" dirty="0" err="1" smtClean="0"/>
+                        <a:t>Phred</a:t>
+                      </a:r>
+                      <a:r>
+                        <a:rPr lang="en-US" dirty="0" smtClean="0"/>
+                        <a:t> quality score Q</a:t>
+                      </a:r>
+                      <a:endParaRPr lang="en-US" dirty="0"/>
+                    </a:p>
+                  </a:txBody>
+                  <a:tcPr/>
+                </a:tc>
+                <a:tc>
+                  <a:txBody>
+                    <a:bodyPr/>
+                    <a:lstStyle/>
+                    <a:p>
+                      <a:r>
+                        <a:rPr lang="en-US" i="1" dirty="0" smtClean="0"/>
+                        <a:t>P</a:t>
+                      </a:r>
+                      <a:r>
+                        <a:rPr lang="en-US" dirty="0" smtClean="0"/>
+                        <a:t> of incorrect base call</a:t>
+                      </a:r>
+                      <a:endParaRPr lang="en-US" dirty="0"/>
+                    </a:p>
+                  </a:txBody>
+                  <a:tcPr/>
+                </a:tc>
+                <a:tc>
+                  <a:txBody>
+                    <a:bodyPr/>
+                    <a:lstStyle/>
+                    <a:p>
+                      <a:r>
+                        <a:rPr lang="en-US" dirty="0" smtClean="0"/>
+                        <a:t>Base call accuracy</a:t>
+                      </a:r>
+                      <a:endParaRPr lang="en-US" dirty="0"/>
+                    </a:p>
+                  </a:txBody>
+                  <a:tcPr/>
+                </a:tc>
+              </a:tr>
+              <a:tr h="370840">
+                <a:tc>
+                  <a:txBody>
+                    <a:bodyPr/>
+                    <a:lstStyle/>
+                    <a:p>
+                      <a:r>
+                        <a:rPr lang="en-US" dirty="0" smtClean="0"/>
+                        <a:t>10</a:t>
+                      </a:r>
+                    </a:p>
+                  </a:txBody>
+                  <a:tcPr/>
+                </a:tc>
+                <a:tc>
+                  <a:txBody>
+                    <a:bodyPr/>
+                    <a:lstStyle/>
+                    <a:p>
+                      <a:r>
+                        <a:rPr lang="en-US" dirty="0" smtClean="0"/>
+                        <a:t>1 in 10</a:t>
+                      </a:r>
+                      <a:endParaRPr lang="en-US" dirty="0"/>
+                    </a:p>
+                  </a:txBody>
+                  <a:tcPr/>
+                </a:tc>
+                <a:tc>
+                  <a:txBody>
+                    <a:bodyPr/>
+                    <a:lstStyle/>
+                    <a:p>
+                      <a:r>
+                        <a:rPr lang="en-US" dirty="0" smtClean="0"/>
+                        <a:t>90%</a:t>
+                      </a:r>
+                      <a:endParaRPr lang="en-US" dirty="0"/>
+                    </a:p>
+                  </a:txBody>
+                  <a:tcPr/>
+                </a:tc>
+              </a:tr>
+              <a:tr h="370840">
+                <a:tc>
+                  <a:txBody>
+                    <a:bodyPr/>
+                    <a:lstStyle/>
+                    <a:p>
+                      <a:r>
+                        <a:rPr lang="en-US" dirty="0" smtClean="0"/>
+                        <a:t>20</a:t>
+                      </a:r>
+                      <a:endParaRPr lang="en-US" dirty="0"/>
+                    </a:p>
+                  </a:txBody>
+                  <a:tcPr/>
+                </a:tc>
+                <a:tc>
+                  <a:txBody>
+                    <a:bodyPr/>
+                    <a:lstStyle/>
+                    <a:p>
+                      <a:r>
+                        <a:rPr lang="en-US" dirty="0" smtClean="0"/>
+                        <a:t>1 in 100</a:t>
+                      </a:r>
+                      <a:endParaRPr lang="en-US" dirty="0"/>
+                    </a:p>
+                  </a:txBody>
+                  <a:tcPr/>
+                </a:tc>
+                <a:tc>
+                  <a:txBody>
+                    <a:bodyPr/>
+                    <a:lstStyle/>
+                    <a:p>
+                      <a:r>
+                        <a:rPr lang="en-US" dirty="0" smtClean="0"/>
+                        <a:t>99%</a:t>
+                      </a:r>
+                      <a:endParaRPr lang="en-US" dirty="0"/>
+                    </a:p>
+                  </a:txBody>
+                  <a:tcPr/>
+                </a:tc>
+              </a:tr>
+              <a:tr h="370840">
+                <a:tc>
+                  <a:txBody>
+                    <a:bodyPr/>
+                    <a:lstStyle/>
+                    <a:p>
+                      <a:r>
+                        <a:rPr lang="en-US" dirty="0" smtClean="0"/>
+                        <a:t>30</a:t>
+                      </a:r>
+                      <a:endParaRPr lang="en-US" dirty="0"/>
+                    </a:p>
+                  </a:txBody>
+                  <a:tcPr/>
+                </a:tc>
+                <a:tc>
+                  <a:txBody>
+                    <a:bodyPr/>
+                    <a:lstStyle/>
+                    <a:p>
+                      <a:r>
+                        <a:rPr lang="en-US" dirty="0" smtClean="0"/>
+                        <a:t>1 in 1,000</a:t>
+                      </a:r>
+                      <a:endParaRPr lang="en-US" dirty="0"/>
+                    </a:p>
+                  </a:txBody>
+                  <a:tcPr/>
+                </a:tc>
+                <a:tc>
+                  <a:txBody>
+                    <a:bodyPr/>
+                    <a:lstStyle/>
+                    <a:p>
+                      <a:r>
+                        <a:rPr lang="en-US" dirty="0" smtClean="0"/>
+                        <a:t>99.9%</a:t>
+                      </a:r>
+                      <a:endParaRPr lang="en-US" dirty="0"/>
+                    </a:p>
+                  </a:txBody>
+                  <a:tcPr/>
+                </a:tc>
+              </a:tr>
+              <a:tr h="370840">
+                <a:tc>
+                  <a:txBody>
+                    <a:bodyPr/>
+                    <a:lstStyle/>
+                    <a:p>
+                      <a:r>
+                        <a:rPr lang="en-US" dirty="0" smtClean="0"/>
+                        <a:t>40</a:t>
+                      </a:r>
+                      <a:endParaRPr lang="en-US" dirty="0"/>
+                    </a:p>
+                  </a:txBody>
+                  <a:tcPr/>
+                </a:tc>
+                <a:tc>
+                  <a:txBody>
+                    <a:bodyPr/>
+                    <a:lstStyle/>
+                    <a:p>
+                      <a:r>
+                        <a:rPr lang="en-US" dirty="0" smtClean="0"/>
+                        <a:t>1 in 10,000</a:t>
+                      </a:r>
+                      <a:endParaRPr lang="en-US" dirty="0"/>
+                    </a:p>
+                  </a:txBody>
+                  <a:tcPr/>
+                </a:tc>
+                <a:tc>
+                  <a:txBody>
+                    <a:bodyPr/>
+                    <a:lstStyle/>
+                    <a:p>
+                      <a:r>
+                        <a:rPr lang="en-US" dirty="0" smtClean="0"/>
+                        <a:t>99.99%</a:t>
+                      </a:r>
+                      <a:endParaRPr lang="en-US" dirty="0"/>
+                    </a:p>
+                  </a:txBody>
+                  <a:tcPr/>
+                </a:tc>
+              </a:tr>
+              <a:tr h="370840">
+                <a:tc>
+                  <a:txBody>
+                    <a:bodyPr/>
+                    <a:lstStyle/>
+                    <a:p>
+                      <a:r>
+                        <a:rPr lang="en-US" dirty="0" smtClean="0"/>
+                        <a:t>50</a:t>
+                      </a:r>
+                      <a:endParaRPr lang="en-US" dirty="0"/>
+                    </a:p>
+                  </a:txBody>
+                  <a:tcPr/>
+                </a:tc>
+                <a:tc>
+                  <a:txBody>
+                    <a:bodyPr/>
+                    <a:lstStyle/>
+                    <a:p>
+                      <a:r>
+                        <a:rPr lang="en-US" dirty="0" smtClean="0"/>
+                        <a:t>1 in 100,000</a:t>
+                      </a:r>
+                      <a:endParaRPr lang="en-US" dirty="0"/>
+                    </a:p>
+                  </a:txBody>
+                  <a:tcPr/>
+                </a:tc>
+                <a:tc>
+                  <a:txBody>
+                    <a:bodyPr/>
+                    <a:lstStyle/>
+                    <a:p>
+                      <a:r>
+                        <a:rPr lang="en-US" dirty="0" smtClean="0"/>
+                        <a:t>99.999%</a:t>
+                      </a:r>
+                      <a:endParaRPr lang="en-US" dirty="0"/>
+                    </a:p>
+                  </a:txBody>
+                  <a:tcPr/>
+                </a:tc>
+              </a:tr>
+            </a:tbl>
+          </a:graphicData>
+        </a:graphic>
+      </p:graphicFrame>
     </p:spTree>
   </p:cSld>
   <p:clrMapOvr>
     <a:masterClrMapping/>
   </p:clrMapOvr>
+  <p:timing>
+    <p:tnLst>
+      <p:par>
+        <p:cTn id="1" dur="indefinite" restart="never" nodeType="tmRoot"/>
+      </p:par>
+    </p:tnLst>
+  </p:timing>
 </p:sld>
 </file>
 
@@ -4249,7 +5333,11 @@
           <a:p>
             <a:r>
               <a:rPr lang="en-US" dirty="0" smtClean="0"/>
-              <a:t>SAM/BAM</a:t>
+              <a:t>FASTA + </a:t>
+            </a:r>
+            <a:r>
+              <a:rPr lang="en-US" dirty="0" err="1" smtClean="0"/>
+              <a:t>Qual</a:t>
             </a:r>
             <a:endParaRPr lang="en-US" dirty="0"/>
           </a:p>
@@ -4257,28 +5345,121 @@
       </p:sp>
       <p:sp>
         <p:nvSpPr>
-          <p:cNvPr id="3" name="Content Placeholder 2"/>
-          <p:cNvSpPr>
-            <a:spLocks noGrp="1"/>
-          </p:cNvSpPr>
-          <p:nvPr>
-            <p:ph idx="1"/>
-          </p:nvPr>
-        </p:nvSpPr>
-        <p:spPr/>
-        <p:txBody>
-          <a:bodyPr/>
-          <a:lstStyle/>
-          <a:p>
-            <a:endParaRPr lang="en-US"/>
-          </a:p>
-        </p:txBody>
-      </p:sp>
+          <p:cNvPr id="16" name="Content Placeholder 15"/>
+          <p:cNvSpPr>
+            <a:spLocks noGrp="1"/>
+          </p:cNvSpPr>
+          <p:nvPr>
+            <p:ph sz="half" idx="1"/>
+          </p:nvPr>
+        </p:nvSpPr>
+        <p:spPr/>
+        <p:txBody>
+          <a:bodyPr/>
+          <a:lstStyle/>
+          <a:p>
+            <a:r>
+              <a:rPr lang="en-US" dirty="0" smtClean="0"/>
+              <a:t>The </a:t>
+            </a:r>
+            <a:r>
+              <a:rPr lang="en-US" i="1" dirty="0" err="1" smtClean="0"/>
+              <a:t>phred</a:t>
+            </a:r>
+            <a:r>
+              <a:rPr lang="en-US" i="1" dirty="0" smtClean="0"/>
+              <a:t> </a:t>
+            </a:r>
+            <a:r>
+              <a:rPr lang="en-US" dirty="0" smtClean="0"/>
+              <a:t>program introduced the *.</a:t>
+            </a:r>
+            <a:r>
+              <a:rPr lang="en-US" dirty="0" err="1" smtClean="0"/>
+              <a:t>qual</a:t>
+            </a:r>
+            <a:r>
+              <a:rPr lang="en-US" dirty="0" smtClean="0"/>
+              <a:t> format</a:t>
+            </a:r>
+          </a:p>
+          <a:p>
+            <a:r>
+              <a:rPr lang="en-US" dirty="0" smtClean="0"/>
+              <a:t>Simply parallel FASTA files with </a:t>
+            </a:r>
+            <a:r>
+              <a:rPr lang="en-US" dirty="0" err="1" smtClean="0"/>
+              <a:t>Phred</a:t>
+            </a:r>
+            <a:r>
+              <a:rPr lang="en-US" dirty="0" smtClean="0"/>
+              <a:t> quality scores as integers</a:t>
+            </a:r>
+            <a:endParaRPr lang="en-US" dirty="0"/>
+          </a:p>
+        </p:txBody>
+      </p:sp>
+      <p:pic>
+        <p:nvPicPr>
+          <p:cNvPr id="14" name="Picture 13" descr="fasta+qual1.jpeg"/>
+          <p:cNvPicPr>
+            <a:picLocks noChangeAspect="1"/>
+          </p:cNvPicPr>
+          <p:nvPr/>
+        </p:nvPicPr>
+        <p:blipFill>
+          <a:blip r:embed="rId2"/>
+          <a:stretch>
+            <a:fillRect/>
+          </a:stretch>
+        </p:blipFill>
+        <p:spPr>
+          <a:xfrm>
+            <a:off x="4419600" y="1768857"/>
+            <a:ext cx="4023868" cy="757301"/>
+          </a:xfrm>
+          <a:prstGeom prst="rect">
+            <a:avLst/>
+          </a:prstGeom>
+        </p:spPr>
+      </p:pic>
+      <p:pic>
+        <p:nvPicPr>
+          <p:cNvPr id="15" name="Picture 14" descr="fasta+qual2.jpeg"/>
+          <p:cNvPicPr>
+            <a:picLocks noChangeAspect="1"/>
+          </p:cNvPicPr>
+          <p:nvPr/>
+        </p:nvPicPr>
+        <p:blipFill>
+          <a:blip r:embed="rId3"/>
+          <a:stretch>
+            <a:fillRect/>
+          </a:stretch>
+        </p:blipFill>
+        <p:spPr>
+          <a:xfrm>
+            <a:off x="4419601" y="2772156"/>
+            <a:ext cx="4054348" cy="1647444"/>
+          </a:xfrm>
+          <a:prstGeom prst="rect">
+            <a:avLst/>
+          </a:prstGeom>
+        </p:spPr>
+      </p:pic>
     </p:spTree>
   </p:cSld>
   <p:clrMapOvr>
     <a:masterClrMapping/>
   </p:clrMapOvr>
+  <p:timing>
+    <p:tnLst>
+      <p:par>
+        <p:cTn id="1" dur="indefinite" restart="never" nodeType="tmRoot"/>
+      </p:par>
+    </p:tnLst>
+  </p:timing>
 </p:sld>
 </file>
 
@@ -4301,7 +5482,7 @@
       </p:grpSpPr>
       <p:sp>
         <p:nvSpPr>
-          <p:cNvPr id="2" name="Title 1"/>
+          <p:cNvPr id="5" name="Title 4"/>
           <p:cNvSpPr>
             <a:spLocks noGrp="1"/>
           </p:cNvSpPr>
@@ -4316,75 +5497,48 @@
           <a:p>
             <a:r>
               <a:rPr lang="en-US" dirty="0" smtClean="0"/>
-              <a:t>Commonly-used tools</a:t>
+              <a:t>ASCII character codes</a:t>
             </a:r>
             <a:endParaRPr lang="en-US" dirty="0"/>
           </a:p>
         </p:txBody>
       </p:sp>
-      <p:sp>
-        <p:nvSpPr>
-          <p:cNvPr id="3" name="Content Placeholder 2"/>
-          <p:cNvSpPr>
-            <a:spLocks noGrp="1"/>
-          </p:cNvSpPr>
+      <p:pic>
+        <p:nvPicPr>
+          <p:cNvPr id="7" name="Content Placeholder 6" descr="asciifull.gif"/>
+          <p:cNvPicPr>
+            <a:picLocks noGrp="1" noChangeAspect="1"/>
+          </p:cNvPicPr>
           <p:nvPr>
             <p:ph idx="1"/>
           </p:nvPr>
-        </p:nvSpPr>
-        <p:spPr/>
-        <p:txBody>
-          <a:bodyPr/>
-          <a:lstStyle/>
-          <a:p>
-            <a:r>
-              <a:rPr lang="en-US" dirty="0" err="1" smtClean="0"/>
-              <a:t>samtools</a:t>
-            </a:r>
-            <a:endParaRPr lang="en-US" dirty="0" smtClean="0"/>
-          </a:p>
-          <a:p>
-            <a:r>
-              <a:rPr lang="en-US" dirty="0" err="1" smtClean="0"/>
-              <a:t>bwa</a:t>
-            </a:r>
-            <a:endParaRPr lang="en-US" dirty="0" smtClean="0"/>
-          </a:p>
-          <a:p>
-            <a:r>
-              <a:rPr lang="en-US" dirty="0" smtClean="0"/>
-              <a:t>GATK</a:t>
-            </a:r>
-          </a:p>
-          <a:p>
-            <a:r>
-              <a:rPr lang="en-US" dirty="0" err="1" smtClean="0"/>
-              <a:t>picard</a:t>
-            </a:r>
-            <a:endParaRPr lang="en-US" dirty="0" smtClean="0"/>
-          </a:p>
-          <a:p>
-            <a:r>
-              <a:rPr lang="en-US" dirty="0" smtClean="0"/>
-              <a:t>bowtie/</a:t>
-            </a:r>
-            <a:r>
-              <a:rPr lang="en-US" dirty="0" err="1" smtClean="0"/>
-              <a:t>tophat</a:t>
-            </a:r>
-            <a:r>
-              <a:rPr lang="en-US" dirty="0" smtClean="0"/>
-              <a:t>/cufflinks</a:t>
-            </a:r>
-            <a:endParaRPr lang="en-US" dirty="0"/>
-          </a:p>
-        </p:txBody>
-      </p:sp>
+        </p:nvPicPr>
+        <p:blipFill>
+          <a:blip r:embed="rId2"/>
+          <a:srcRect/>
+          <a:stretch>
+            <a:fillRect/>
+          </a:stretch>
+        </p:blipFill>
+        <p:spPr>
+          <a:xfrm>
+            <a:off x="838200" y="1295400"/>
+            <a:ext cx="7772400" cy="5304765"/>
+          </a:xfrm>
+        </p:spPr>
+      </p:pic>
     </p:spTree>
   </p:cSld>
   <p:clrMapOvr>
     <a:masterClrMapping/>
   </p:clrMapOvr>
+  <p:timing>
+    <p:tnLst>
+      <p:par>
+        <p:cTn id="1" dur="indefinite" restart="never" nodeType="tmRoot"/>
+      </p:par>
+    </p:tnLst>
+  </p:timing>
 </p:sld>
 </file>
 
@@ -4422,7 +5576,7 @@
           <a:p>
             <a:r>
               <a:rPr lang="en-US" dirty="0" smtClean="0"/>
-              <a:t>Integrated suites</a:t>
+              <a:t>FASTQ</a:t>
             </a:r>
             <a:endParaRPr lang="en-US" dirty="0"/>
           </a:p>
@@ -4430,30 +5584,121 @@
       </p:sp>
       <p:sp>
         <p:nvSpPr>
-          <p:cNvPr id="3" name="Content Placeholder 2"/>
-          <p:cNvSpPr>
-            <a:spLocks noGrp="1"/>
-          </p:cNvSpPr>
-          <p:nvPr>
-            <p:ph idx="1"/>
-          </p:nvPr>
-        </p:nvSpPr>
-        <p:spPr/>
-        <p:txBody>
-          <a:bodyPr/>
-          <a:lstStyle/>
-          <a:p>
-            <a:r>
-              <a:rPr lang="en-US" dirty="0" smtClean="0"/>
-              <a:t>CLC</a:t>
-            </a:r>
-          </a:p>
-          <a:p>
+          <p:cNvPr id="4" name="Content Placeholder 3"/>
+          <p:cNvSpPr>
+            <a:spLocks noGrp="1"/>
+          </p:cNvSpPr>
+          <p:nvPr>
+            <p:ph sz="half" idx="1"/>
+          </p:nvPr>
+        </p:nvSpPr>
+        <p:spPr/>
+        <p:txBody>
+          <a:bodyPr/>
+          <a:lstStyle/>
+          <a:p>
+            <a:pPr>
+              <a:buNone/>
+            </a:pPr>
+            <a:r>
+              <a:rPr lang="en-US" dirty="0" smtClean="0"/>
+              <a:t>FASTQ formatted syntax:</a:t>
+            </a:r>
+          </a:p>
+          <a:p>
+            <a:r>
+              <a:rPr lang="en-US" dirty="0" smtClean="0"/>
+              <a:t>@title (and description)</a:t>
+            </a:r>
+          </a:p>
+          <a:p>
+            <a:r>
+              <a:rPr lang="en-US" dirty="0" smtClean="0"/>
+              <a:t>Sequence</a:t>
+            </a:r>
+          </a:p>
+          <a:p>
+            <a:r>
+              <a:rPr lang="en-US" dirty="0" smtClean="0"/>
+              <a:t>+(Repeat of title line)</a:t>
+            </a:r>
+          </a:p>
+          <a:p>
+            <a:r>
+              <a:rPr lang="en-US" dirty="0" smtClean="0"/>
+              <a:t>Quality lines map </a:t>
+            </a:r>
             <a:r>
               <a:rPr lang="en-US" dirty="0" err="1" smtClean="0"/>
-              <a:t>Geneious</a:t>
+              <a:t>phred</a:t>
+            </a:r>
+            <a:r>
+              <a:rPr lang="en-US" dirty="0" smtClean="0"/>
+              <a:t> scores to ASCII characters</a:t>
             </a:r>
             <a:endParaRPr lang="en-US" dirty="0"/>
+          </a:p>
+        </p:txBody>
+      </p:sp>
+      <p:pic>
+        <p:nvPicPr>
+          <p:cNvPr id="8" name="Content Placeholder 7" descr="nbi110601.gif"/>
+          <p:cNvPicPr>
+            <a:picLocks noGrp="1" noChangeAspect="1"/>
+          </p:cNvPicPr>
+          <p:nvPr>
+            <p:ph sz="half" idx="2"/>
+          </p:nvPr>
+        </p:nvPicPr>
+        <p:blipFill>
+          <a:blip r:embed="rId3"/>
+          <a:srcRect l="-5596" r="-5596" b="40748"/>
+          <a:stretch>
+            <a:fillRect/>
+          </a:stretch>
+        </p:blipFill>
+        <p:spPr>
+          <a:xfrm>
+            <a:off x="4417489" y="1752600"/>
+            <a:ext cx="4345511" cy="3276600"/>
+          </a:xfrm>
+        </p:spPr>
+      </p:pic>
+      <p:sp>
+        <p:nvSpPr>
+          <p:cNvPr id="9" name="TextBox 8"/>
+          <p:cNvSpPr txBox="1"/>
+          <p:nvPr/>
+        </p:nvSpPr>
+        <p:spPr>
+          <a:xfrm>
+            <a:off x="457200" y="5634335"/>
+            <a:ext cx="8216161" cy="461665"/>
+          </a:xfrm>
+          <a:prstGeom prst="rect">
+            <a:avLst/>
+          </a:prstGeom>
+          <a:noFill/>
+        </p:spPr>
+        <p:txBody>
+          <a:bodyPr wrap="none" rtlCol="0">
+            <a:spAutoFit/>
+          </a:bodyPr>
+          <a:lstStyle/>
+          <a:p>
+            <a:r>
+              <a:rPr lang="en-US" sz="2400" b="1" dirty="0" smtClean="0"/>
+              <a:t>Different platforms map </a:t>
+            </a:r>
+            <a:r>
+              <a:rPr lang="en-US" sz="2400" b="1" dirty="0" err="1" smtClean="0"/>
+              <a:t>phred</a:t>
+            </a:r>
+            <a:r>
+              <a:rPr lang="en-US" sz="2400" b="1" dirty="0" smtClean="0"/>
+              <a:t> scores in different ways to ASCII</a:t>
+            </a:r>
+            <a:endParaRPr lang="en-US" sz="2400" b="1" dirty="0"/>
           </a:p>
         </p:txBody>
       </p:sp>
@@ -4462,6 +5707,13 @@
   <p:clrMapOvr>
     <a:masterClrMapping/>
   </p:clrMapOvr>
+  <p:timing>
+    <p:tnLst>
+      <p:par>
+        <p:cTn id="1" dur="indefinite" restart="never" nodeType="tmRoot"/>
+      </p:par>
+    </p:tnLst>
+  </p:timing>
 </p:sld>
 </file>
 
@@ -4499,7 +5751,15 @@
           <a:p>
             <a:r>
               <a:rPr lang="en-US" dirty="0" smtClean="0"/>
-              <a:t>Open source and commercial</a:t>
+              <a:t>Standard </a:t>
+            </a:r>
+            <a:r>
+              <a:rPr lang="en-US" dirty="0" err="1" smtClean="0"/>
+              <a:t>Flowgram</a:t>
+            </a:r>
+            <a:r>
+              <a:rPr lang="en-US" dirty="0" smtClean="0"/>
+              <a:t> Format</a:t>
             </a:r>
             <a:endParaRPr lang="en-US" dirty="0"/>
           </a:p>
@@ -4507,20 +5767,181 @@
       </p:sp>
       <p:sp>
         <p:nvSpPr>
+          <p:cNvPr id="8" name="Text Placeholder 7"/>
+          <p:cNvSpPr>
+            <a:spLocks noGrp="1"/>
+          </p:cNvSpPr>
+          <p:nvPr>
+            <p:ph type="body" idx="1"/>
+          </p:nvPr>
+        </p:nvSpPr>
+        <p:spPr/>
+        <p:txBody>
+          <a:bodyPr/>
+          <a:lstStyle/>
+          <a:p>
+            <a:r>
+              <a:rPr lang="en-US" dirty="0" smtClean="0"/>
+              <a:t>Description</a:t>
+            </a:r>
+            <a:endParaRPr lang="en-US" dirty="0"/>
+          </a:p>
+        </p:txBody>
+      </p:sp>
+      <p:sp>
+        <p:nvSpPr>
           <p:cNvPr id="3" name="Content Placeholder 2"/>
           <p:cNvSpPr>
             <a:spLocks noGrp="1"/>
           </p:cNvSpPr>
           <p:nvPr>
-            <p:ph idx="1"/>
-          </p:nvPr>
-        </p:nvSpPr>
-        <p:spPr/>
-        <p:txBody>
-          <a:bodyPr/>
-          <a:lstStyle/>
-          <a:p>
-            <a:endParaRPr lang="en-US"/>
+            <p:ph sz="half" idx="2"/>
+          </p:nvPr>
+        </p:nvSpPr>
+        <p:spPr/>
+        <p:txBody>
+          <a:bodyPr/>
+          <a:lstStyle/>
+          <a:p>
+            <a:r>
+              <a:rPr lang="en-US" dirty="0" smtClean="0"/>
+              <a:t>SFF file format is a container file for storing one or many 454 reads</a:t>
+            </a:r>
+            <a:r>
+              <a:rPr lang="en-US" dirty="0" smtClean="0"/>
+              <a:t>.</a:t>
+            </a:r>
+          </a:p>
+          <a:p>
+            <a:r>
+              <a:rPr lang="en-US" dirty="0" smtClean="0"/>
+              <a:t>Binary format</a:t>
+            </a:r>
+          </a:p>
+          <a:p>
+            <a:r>
+              <a:rPr lang="en-US" dirty="0" smtClean="0"/>
+              <a:t>Structure:</a:t>
+            </a:r>
+          </a:p>
+          <a:p>
+            <a:pPr lvl="1"/>
+            <a:r>
+              <a:rPr lang="en-US" dirty="0" smtClean="0"/>
+              <a:t>Common header with metadata</a:t>
+            </a:r>
+          </a:p>
+          <a:p>
+            <a:pPr lvl="1"/>
+            <a:r>
+              <a:rPr lang="en-US" dirty="0" smtClean="0"/>
+              <a:t>Read header</a:t>
+            </a:r>
+          </a:p>
+          <a:p>
+            <a:pPr lvl="1"/>
+            <a:r>
+              <a:rPr lang="en-US" dirty="0" smtClean="0"/>
+              <a:t>Read data</a:t>
+            </a:r>
+            <a:endParaRPr lang="en-US" dirty="0"/>
+          </a:p>
+        </p:txBody>
+      </p:sp>
+      <p:sp>
+        <p:nvSpPr>
+          <p:cNvPr id="9" name="Text Placeholder 8"/>
+          <p:cNvSpPr>
+            <a:spLocks noGrp="1"/>
+          </p:cNvSpPr>
+          <p:nvPr>
+            <p:ph type="body" sz="quarter" idx="3"/>
+          </p:nvPr>
+        </p:nvSpPr>
+        <p:spPr/>
+        <p:txBody>
+          <a:bodyPr/>
+          <a:lstStyle/>
+          <a:p>
+            <a:r>
+              <a:rPr lang="en-US" dirty="0" smtClean="0"/>
+              <a:t>Tools</a:t>
+            </a:r>
+            <a:endParaRPr lang="en-US" dirty="0"/>
+          </a:p>
+        </p:txBody>
+      </p:sp>
+      <p:sp>
+        <p:nvSpPr>
+          <p:cNvPr id="10" name="Content Placeholder 9"/>
+          <p:cNvSpPr>
+            <a:spLocks noGrp="1"/>
+          </p:cNvSpPr>
+          <p:nvPr>
+            <p:ph sz="quarter" idx="4"/>
+          </p:nvPr>
+        </p:nvSpPr>
+        <p:spPr/>
+        <p:txBody>
+          <a:bodyPr/>
+          <a:lstStyle/>
+          <a:p>
+            <a:r>
+              <a:rPr lang="en-US" b="1" dirty="0" err="1" smtClean="0"/>
+              <a:t>sffinfo</a:t>
+            </a:r>
+            <a:r>
+              <a:rPr lang="en-US" b="1" dirty="0" smtClean="0"/>
+              <a:t> </a:t>
+            </a:r>
+            <a:r>
+              <a:rPr lang="en-US" dirty="0" smtClean="0"/>
+              <a:t>- from 454</a:t>
+            </a:r>
+          </a:p>
+          <a:p>
+            <a:r>
+              <a:rPr lang="en-US" b="1" dirty="0" err="1" smtClean="0"/>
+              <a:t>sff_extract</a:t>
+            </a:r>
+            <a:r>
+              <a:rPr lang="en-US" b="1" dirty="0" smtClean="0"/>
+              <a:t> </a:t>
+            </a:r>
+            <a:r>
+              <a:rPr lang="en-US" dirty="0" smtClean="0"/>
+              <a:t>- python</a:t>
+            </a:r>
+          </a:p>
+          <a:p>
+            <a:r>
+              <a:rPr lang="en-US" b="1" dirty="0" err="1" smtClean="0"/>
+              <a:t>Bio::SFF</a:t>
+            </a:r>
+            <a:r>
+              <a:rPr lang="en-US" b="1" dirty="0" smtClean="0"/>
+              <a:t> </a:t>
+            </a:r>
+            <a:r>
+              <a:rPr lang="en-US" dirty="0" smtClean="0"/>
+              <a:t>- </a:t>
+            </a:r>
+            <a:r>
+              <a:rPr lang="en-US" dirty="0" err="1" smtClean="0"/>
+              <a:t>perl</a:t>
+            </a:r>
+            <a:endParaRPr lang="en-US" dirty="0" smtClean="0"/>
+          </a:p>
+          <a:p>
+            <a:r>
+              <a:rPr lang="en-US" b="1" dirty="0" smtClean="0"/>
+              <a:t>sff2fastq </a:t>
+            </a:r>
+            <a:r>
+              <a:rPr lang="en-US" dirty="0" smtClean="0"/>
+              <a:t>- binary</a:t>
+            </a:r>
+            <a:endParaRPr lang="en-US" dirty="0"/>
           </a:p>
         </p:txBody>
       </p:sp>
@@ -4529,6 +5950,13 @@
   <p:clrMapOvr>
     <a:masterClrMapping/>
   </p:clrMapOvr>
+  <p:timing>
+    <p:tnLst>
+      <p:par>
+        <p:cTn id="1" dur="indefinite" restart="never" nodeType="tmRoot"/>
+      </p:par>
+    </p:tnLst>
+  </p:timing>
 </p:sld>
 </file>
 
@@ -4566,7 +5994,7 @@
           <a:p>
             <a:r>
               <a:rPr lang="en-US" dirty="0" smtClean="0"/>
-              <a:t>Visual and command-line</a:t>
+              <a:t>SAM/BAM</a:t>
             </a:r>
             <a:endParaRPr lang="en-US" dirty="0"/>
           </a:p>
@@ -4596,6 +6024,13 @@
   <p:clrMapOvr>
     <a:masterClrMapping/>
   </p:clrMapOvr>
+  <p:timing>
+    <p:tnLst>
+      <p:par>
+        <p:cTn id="1" dur="indefinite" restart="never" nodeType="tmRoot"/>
+      </p:par>
+    </p:tnLst>
+  </p:timing>
 </p:sld>
 </file>
 

</xml_diff>

<commit_message>
added more info about FASTQ phred line differences among platforms
</commit_message>
<xml_diff>
--- a/doc/slides/day1/session2/NGSdata.pptx
+++ b/doc/slides/day1/session2/NGSdata.pptx
@@ -206,7 +206,7 @@
             <a:fld id="{1CBEE33A-660E-C84A-B828-66CD4386E7A3}" type="datetimeFigureOut">
               <a:rPr lang="en-US" smtClean="0"/>
               <a:pPr/>
-              <a:t>9/7/12</a:t>
+              <a:t>9/8/12</a:t>
             </a:fld>
             <a:endParaRPr lang="en-US"/>
           </a:p>
@@ -1458,7 +1458,7 @@
             <a:fld id="{4787E004-ACAC-BD41-B9FE-40E1A0F71FA8}" type="datetimeFigureOut">
               <a:rPr lang="en-US" smtClean="0"/>
               <a:pPr/>
-              <a:t>9/7/12</a:t>
+              <a:t>9/8/12</a:t>
             </a:fld>
             <a:endParaRPr lang="en-US"/>
           </a:p>
@@ -1625,7 +1625,7 @@
             <a:fld id="{4787E004-ACAC-BD41-B9FE-40E1A0F71FA8}" type="datetimeFigureOut">
               <a:rPr lang="en-US" smtClean="0"/>
               <a:pPr/>
-              <a:t>9/7/12</a:t>
+              <a:t>9/8/12</a:t>
             </a:fld>
             <a:endParaRPr lang="en-US"/>
           </a:p>
@@ -1802,7 +1802,7 @@
             <a:fld id="{4787E004-ACAC-BD41-B9FE-40E1A0F71FA8}" type="datetimeFigureOut">
               <a:rPr lang="en-US" smtClean="0"/>
               <a:pPr/>
-              <a:t>9/7/12</a:t>
+              <a:t>9/8/12</a:t>
             </a:fld>
             <a:endParaRPr lang="en-US"/>
           </a:p>
@@ -1969,7 +1969,7 @@
             <a:fld id="{4787E004-ACAC-BD41-B9FE-40E1A0F71FA8}" type="datetimeFigureOut">
               <a:rPr lang="en-US" smtClean="0"/>
               <a:pPr/>
-              <a:t>9/7/12</a:t>
+              <a:t>9/8/12</a:t>
             </a:fld>
             <a:endParaRPr lang="en-US"/>
           </a:p>
@@ -2212,7 +2212,7 @@
             <a:fld id="{4787E004-ACAC-BD41-B9FE-40E1A0F71FA8}" type="datetimeFigureOut">
               <a:rPr lang="en-US" smtClean="0"/>
               <a:pPr/>
-              <a:t>9/7/12</a:t>
+              <a:t>9/8/12</a:t>
             </a:fld>
             <a:endParaRPr lang="en-US"/>
           </a:p>
@@ -2497,7 +2497,7 @@
             <a:fld id="{4787E004-ACAC-BD41-B9FE-40E1A0F71FA8}" type="datetimeFigureOut">
               <a:rPr lang="en-US" smtClean="0"/>
               <a:pPr/>
-              <a:t>9/7/12</a:t>
+              <a:t>9/8/12</a:t>
             </a:fld>
             <a:endParaRPr lang="en-US"/>
           </a:p>
@@ -2916,7 +2916,7 @@
             <a:fld id="{4787E004-ACAC-BD41-B9FE-40E1A0F71FA8}" type="datetimeFigureOut">
               <a:rPr lang="en-US" smtClean="0"/>
               <a:pPr/>
-              <a:t>9/7/12</a:t>
+              <a:t>9/8/12</a:t>
             </a:fld>
             <a:endParaRPr lang="en-US"/>
           </a:p>
@@ -3031,7 +3031,7 @@
             <a:fld id="{4787E004-ACAC-BD41-B9FE-40E1A0F71FA8}" type="datetimeFigureOut">
               <a:rPr lang="en-US" smtClean="0"/>
               <a:pPr/>
-              <a:t>9/7/12</a:t>
+              <a:t>9/8/12</a:t>
             </a:fld>
             <a:endParaRPr lang="en-US"/>
           </a:p>
@@ -3123,7 +3123,7 @@
             <a:fld id="{4787E004-ACAC-BD41-B9FE-40E1A0F71FA8}" type="datetimeFigureOut">
               <a:rPr lang="en-US" smtClean="0"/>
               <a:pPr/>
-              <a:t>9/7/12</a:t>
+              <a:t>9/8/12</a:t>
             </a:fld>
             <a:endParaRPr lang="en-US"/>
           </a:p>
@@ -3397,7 +3397,7 @@
             <a:fld id="{4787E004-ACAC-BD41-B9FE-40E1A0F71FA8}" type="datetimeFigureOut">
               <a:rPr lang="en-US" smtClean="0"/>
               <a:pPr/>
-              <a:t>9/7/12</a:t>
+              <a:t>9/8/12</a:t>
             </a:fld>
             <a:endParaRPr lang="en-US"/>
           </a:p>
@@ -3647,7 +3647,7 @@
             <a:fld id="{4787E004-ACAC-BD41-B9FE-40E1A0F71FA8}" type="datetimeFigureOut">
               <a:rPr lang="en-US" smtClean="0"/>
               <a:pPr/>
-              <a:t>9/7/12</a:t>
+              <a:t>9/8/12</a:t>
             </a:fld>
             <a:endParaRPr lang="en-US"/>
           </a:p>
@@ -3857,7 +3857,7 @@
             <a:fld id="{4787E004-ACAC-BD41-B9FE-40E1A0F71FA8}" type="datetimeFigureOut">
               <a:rPr lang="en-US" smtClean="0"/>
               <a:pPr/>
-              <a:t>9/7/12</a:t>
+              <a:t>9/8/12</a:t>
             </a:fld>
             <a:endParaRPr lang="en-US"/>
           </a:p>
@@ -5966,7 +5966,12 @@
             <p:ph sz="half" idx="1"/>
           </p:nvPr>
         </p:nvSpPr>
-        <p:spPr/>
+        <p:spPr>
+          <a:xfrm>
+            <a:off x="457200" y="1295400"/>
+            <a:ext cx="4038600" cy="4525963"/>
+          </a:xfrm>
+        </p:spPr>
         <p:txBody>
           <a:bodyPr/>
           <a:lstStyle/>
@@ -6033,7 +6038,7 @@
         </p:blipFill>
         <p:spPr>
           <a:xfrm>
-            <a:off x="4417489" y="1752600"/>
+            <a:off x="4417489" y="1447800"/>
             <a:ext cx="4345511" cy="3276600"/>
           </a:xfrm>
         </p:spPr>
@@ -6046,8 +6051,8 @@
         </p:nvSpPr>
         <p:spPr>
           <a:xfrm>
-            <a:off x="457200" y="5634335"/>
-            <a:ext cx="8216161" cy="461665"/>
+            <a:off x="457200" y="4953000"/>
+            <a:ext cx="8301071" cy="1569660"/>
           </a:xfrm>
           <a:prstGeom prst="rect">
             <a:avLst/>
@@ -6070,9 +6075,43 @@
             </a:r>
             <a:r>
               <a:rPr lang="en-US" sz="2400" b="1" dirty="0" smtClean="0"/>
-              <a:t> scores in different ways to ASCII</a:t>
-            </a:r>
-            <a:endParaRPr lang="en-US" sz="2400" b="1" dirty="0"/>
+              <a:t> scores in different ways to </a:t>
+            </a:r>
+            <a:r>
+              <a:rPr lang="en-US" sz="2400" b="1" dirty="0" smtClean="0"/>
+              <a:t>ASCII:</a:t>
+            </a:r>
+          </a:p>
+          <a:p>
+            <a:r>
+              <a:rPr lang="en-US" sz="2400" dirty="0" err="1" smtClean="0"/>
+              <a:t>sanger</a:t>
+            </a:r>
+            <a:r>
+              <a:rPr lang="en-US" sz="2400" dirty="0" smtClean="0"/>
+              <a:t>: 33..126</a:t>
+            </a:r>
+          </a:p>
+          <a:p>
+            <a:r>
+              <a:rPr lang="en-US" sz="2400" dirty="0" err="1" smtClean="0"/>
+              <a:t>solexa</a:t>
+            </a:r>
+            <a:r>
+              <a:rPr lang="en-US" sz="2400" dirty="0" smtClean="0"/>
+              <a:t>: 59..126</a:t>
+            </a:r>
+          </a:p>
+          <a:p>
+            <a:r>
+              <a:rPr lang="en-US" sz="2400" dirty="0" err="1" smtClean="0"/>
+              <a:t>illumina</a:t>
+            </a:r>
+            <a:r>
+              <a:rPr lang="en-US" sz="2400" dirty="0" smtClean="0"/>
+              <a:t>: 64..126</a:t>
+            </a:r>
+            <a:endParaRPr lang="en-US" sz="2400" dirty="0"/>
           </a:p>
         </p:txBody>
       </p:sp>

</xml_diff>

<commit_message>
day 4 nearly done now
</commit_message>
<xml_diff>
--- a/doc/slides/day1/session2/NGSdata.pptx
+++ b/doc/slides/day1/session2/NGSdata.pptx
@@ -206,7 +206,7 @@
             <a:fld id="{1CBEE33A-660E-C84A-B828-66CD4386E7A3}" type="datetimeFigureOut">
               <a:rPr lang="en-US" smtClean="0"/>
               <a:pPr/>
-              <a:t>9/8/12</a:t>
+              <a:t>9/9/12</a:t>
             </a:fld>
             <a:endParaRPr lang="en-US"/>
           </a:p>
@@ -1458,7 +1458,7 @@
             <a:fld id="{4787E004-ACAC-BD41-B9FE-40E1A0F71FA8}" type="datetimeFigureOut">
               <a:rPr lang="en-US" smtClean="0"/>
               <a:pPr/>
-              <a:t>9/8/12</a:t>
+              <a:t>9/9/12</a:t>
             </a:fld>
             <a:endParaRPr lang="en-US"/>
           </a:p>
@@ -1625,7 +1625,7 @@
             <a:fld id="{4787E004-ACAC-BD41-B9FE-40E1A0F71FA8}" type="datetimeFigureOut">
               <a:rPr lang="en-US" smtClean="0"/>
               <a:pPr/>
-              <a:t>9/8/12</a:t>
+              <a:t>9/9/12</a:t>
             </a:fld>
             <a:endParaRPr lang="en-US"/>
           </a:p>
@@ -1802,7 +1802,7 @@
             <a:fld id="{4787E004-ACAC-BD41-B9FE-40E1A0F71FA8}" type="datetimeFigureOut">
               <a:rPr lang="en-US" smtClean="0"/>
               <a:pPr/>
-              <a:t>9/8/12</a:t>
+              <a:t>9/9/12</a:t>
             </a:fld>
             <a:endParaRPr lang="en-US"/>
           </a:p>
@@ -1969,7 +1969,7 @@
             <a:fld id="{4787E004-ACAC-BD41-B9FE-40E1A0F71FA8}" type="datetimeFigureOut">
               <a:rPr lang="en-US" smtClean="0"/>
               <a:pPr/>
-              <a:t>9/8/12</a:t>
+              <a:t>9/9/12</a:t>
             </a:fld>
             <a:endParaRPr lang="en-US"/>
           </a:p>
@@ -2212,7 +2212,7 @@
             <a:fld id="{4787E004-ACAC-BD41-B9FE-40E1A0F71FA8}" type="datetimeFigureOut">
               <a:rPr lang="en-US" smtClean="0"/>
               <a:pPr/>
-              <a:t>9/8/12</a:t>
+              <a:t>9/9/12</a:t>
             </a:fld>
             <a:endParaRPr lang="en-US"/>
           </a:p>
@@ -2497,7 +2497,7 @@
             <a:fld id="{4787E004-ACAC-BD41-B9FE-40E1A0F71FA8}" type="datetimeFigureOut">
               <a:rPr lang="en-US" smtClean="0"/>
               <a:pPr/>
-              <a:t>9/8/12</a:t>
+              <a:t>9/9/12</a:t>
             </a:fld>
             <a:endParaRPr lang="en-US"/>
           </a:p>
@@ -2916,7 +2916,7 @@
             <a:fld id="{4787E004-ACAC-BD41-B9FE-40E1A0F71FA8}" type="datetimeFigureOut">
               <a:rPr lang="en-US" smtClean="0"/>
               <a:pPr/>
-              <a:t>9/8/12</a:t>
+              <a:t>9/9/12</a:t>
             </a:fld>
             <a:endParaRPr lang="en-US"/>
           </a:p>
@@ -3031,7 +3031,7 @@
             <a:fld id="{4787E004-ACAC-BD41-B9FE-40E1A0F71FA8}" type="datetimeFigureOut">
               <a:rPr lang="en-US" smtClean="0"/>
               <a:pPr/>
-              <a:t>9/8/12</a:t>
+              <a:t>9/9/12</a:t>
             </a:fld>
             <a:endParaRPr lang="en-US"/>
           </a:p>
@@ -3123,7 +3123,7 @@
             <a:fld id="{4787E004-ACAC-BD41-B9FE-40E1A0F71FA8}" type="datetimeFigureOut">
               <a:rPr lang="en-US" smtClean="0"/>
               <a:pPr/>
-              <a:t>9/8/12</a:t>
+              <a:t>9/9/12</a:t>
             </a:fld>
             <a:endParaRPr lang="en-US"/>
           </a:p>
@@ -3397,7 +3397,7 @@
             <a:fld id="{4787E004-ACAC-BD41-B9FE-40E1A0F71FA8}" type="datetimeFigureOut">
               <a:rPr lang="en-US" smtClean="0"/>
               <a:pPr/>
-              <a:t>9/8/12</a:t>
+              <a:t>9/9/12</a:t>
             </a:fld>
             <a:endParaRPr lang="en-US"/>
           </a:p>
@@ -3647,7 +3647,7 @@
             <a:fld id="{4787E004-ACAC-BD41-B9FE-40E1A0F71FA8}" type="datetimeFigureOut">
               <a:rPr lang="en-US" smtClean="0"/>
               <a:pPr/>
-              <a:t>9/8/12</a:t>
+              <a:t>9/9/12</a:t>
             </a:fld>
             <a:endParaRPr lang="en-US"/>
           </a:p>
@@ -3857,7 +3857,7 @@
             <a:fld id="{4787E004-ACAC-BD41-B9FE-40E1A0F71FA8}" type="datetimeFigureOut">
               <a:rPr lang="en-US" smtClean="0"/>
               <a:pPr/>
-              <a:t>9/8/12</a:t>
+              <a:t>9/9/12</a:t>
             </a:fld>
             <a:endParaRPr lang="en-US"/>
           </a:p>
@@ -4245,7 +4245,11 @@
           <a:p>
             <a:r>
               <a:rPr lang="en-US" dirty="0" smtClean="0"/>
-              <a:t>NGS data</a:t>
+              <a:t>NGS </a:t>
+            </a:r>
+            <a:r>
+              <a:rPr lang="en-US" dirty="0" smtClean="0"/>
+              <a:t>data formats</a:t>
             </a:r>
             <a:endParaRPr lang="en-US" dirty="0"/>
           </a:p>
@@ -4773,48 +4777,52 @@
           <a:p>
             <a:r>
               <a:rPr lang="en-US" dirty="0" smtClean="0"/>
-              <a:t>Once data cleaning, alignment or assembly are complete, further annotation follows, e.g.</a:t>
+              <a:t>Once data cleaning, alignment or assembly are complete, further annotation</a:t>
+            </a:r>
+            <a:r>
+              <a:rPr lang="en-US" dirty="0" smtClean="0"/>
+              <a:t> and variant calling follows</a:t>
+            </a:r>
+          </a:p>
+          <a:p>
+            <a:r>
+              <a:rPr lang="en-US" dirty="0" smtClean="0"/>
+              <a:t>Various tabular data conventions exist</a:t>
             </a:r>
           </a:p>
           <a:p>
             <a:pPr lvl="1"/>
             <a:r>
               <a:rPr lang="en-US" dirty="0" smtClean="0"/>
-              <a:t>Structural variation</a:t>
+              <a:t>BED</a:t>
             </a:r>
           </a:p>
           <a:p>
             <a:pPr lvl="1"/>
             <a:r>
-              <a:rPr lang="en-US" smtClean="0"/>
-              <a:t>SNPs</a:t>
-            </a:r>
-          </a:p>
-          <a:p>
-            <a:r>
-              <a:rPr lang="en-US" dirty="0" smtClean="0"/>
-              <a:t>Various tabular data conventions exist</a:t>
+              <a:rPr lang="en-US" dirty="0" smtClean="0"/>
+              <a:t>VCF</a:t>
             </a:r>
           </a:p>
           <a:p>
             <a:pPr lvl="1"/>
             <a:r>
               <a:rPr lang="en-US" dirty="0" smtClean="0"/>
-              <a:t>BED</a:t>
-            </a:r>
-          </a:p>
-          <a:p>
-            <a:pPr lvl="1"/>
-            <a:r>
-              <a:rPr lang="en-US" dirty="0" smtClean="0"/>
-              <a:t>VCG</a:t>
-            </a:r>
-          </a:p>
-          <a:p>
-            <a:pPr lvl="1"/>
-            <a:r>
-              <a:rPr lang="en-US" dirty="0" smtClean="0"/>
-              <a:t>GFF, GFF3, GTF</a:t>
+              <a:t>GFF, GFF3, </a:t>
+            </a:r>
+            <a:r>
+              <a:rPr lang="en-US" dirty="0" smtClean="0"/>
+              <a:t>GTF</a:t>
+            </a:r>
+          </a:p>
+          <a:p>
+            <a:r>
+              <a:rPr lang="en-US" dirty="0" smtClean="0"/>
+              <a:t>Also continuous annotations: WIG, </a:t>
+            </a:r>
+            <a:r>
+              <a:rPr lang="en-US" dirty="0" err="1" smtClean="0"/>
+              <a:t>BigWig</a:t>
             </a:r>
             <a:endParaRPr lang="en-US" dirty="0"/>
           </a:p>
@@ -5043,7 +5051,11 @@
           <a:p>
             <a:r>
               <a:rPr lang="en-US" b="1" dirty="0" smtClean="0"/>
-              <a:t>VCF</a:t>
+              <a:t>VCF/BED</a:t>
+            </a:r>
+            <a:r>
+              <a:rPr lang="en-US" b="1" smtClean="0"/>
+              <a:t>/GFF/GTF</a:t>
             </a:r>
             <a:endParaRPr lang="en-US" b="1" dirty="0"/>
           </a:p>
@@ -6075,11 +6087,7 @@
             </a:r>
             <a:r>
               <a:rPr lang="en-US" sz="2400" b="1" dirty="0" smtClean="0"/>
-              <a:t> scores in different ways to </a:t>
-            </a:r>
-            <a:r>
-              <a:rPr lang="en-US" sz="2400" b="1" dirty="0" smtClean="0"/>
-              <a:t>ASCII:</a:t>
+              <a:t> scores in different ways to ASCII:</a:t>
             </a:r>
           </a:p>
           <a:p>

</xml_diff>